<commit_message>
noi dung sua ngay 23/07/2024
</commit_message>
<xml_diff>
--- a/Tài Liệu về Git.pptx
+++ b/Tài Liệu về Git.pptx
@@ -23,17 +23,19 @@
     <p:sldId id="276" r:id="rId17"/>
     <p:sldId id="277" r:id="rId18"/>
     <p:sldId id="280" r:id="rId19"/>
-    <p:sldId id="281" r:id="rId20"/>
-    <p:sldId id="282" r:id="rId21"/>
-    <p:sldId id="283" r:id="rId22"/>
-    <p:sldId id="284" r:id="rId23"/>
-    <p:sldId id="257" r:id="rId24"/>
-    <p:sldId id="258" r:id="rId25"/>
-    <p:sldId id="259" r:id="rId26"/>
-    <p:sldId id="260" r:id="rId27"/>
-    <p:sldId id="261" r:id="rId28"/>
-    <p:sldId id="278" r:id="rId29"/>
-    <p:sldId id="279" r:id="rId30"/>
+    <p:sldId id="285" r:id="rId20"/>
+    <p:sldId id="286" r:id="rId21"/>
+    <p:sldId id="281" r:id="rId22"/>
+    <p:sldId id="282" r:id="rId23"/>
+    <p:sldId id="283" r:id="rId24"/>
+    <p:sldId id="284" r:id="rId25"/>
+    <p:sldId id="257" r:id="rId26"/>
+    <p:sldId id="258" r:id="rId27"/>
+    <p:sldId id="259" r:id="rId28"/>
+    <p:sldId id="260" r:id="rId29"/>
+    <p:sldId id="261" r:id="rId30"/>
+    <p:sldId id="278" r:id="rId31"/>
+    <p:sldId id="279" r:id="rId32"/>
   </p:sldIdLst>
   <p:sldSz cx="12192000" cy="6858000"/>
   <p:notesSz cx="6858000" cy="9144000"/>
@@ -269,7 +271,7 @@
           <a:p>
             <a:fld id="{4D508FE5-B1ED-486B-B74B-695E0C12B73B}" type="datetimeFigureOut">
               <a:rPr lang="en-US" smtClean="0"/>
-              <a:t>22/07/2024</a:t>
+              <a:t>23/07/2024</a:t>
             </a:fld>
             <a:endParaRPr lang="en-US"/>
           </a:p>
@@ -437,7 +439,7 @@
           <a:p>
             <a:fld id="{4D508FE5-B1ED-486B-B74B-695E0C12B73B}" type="datetimeFigureOut">
               <a:rPr lang="en-US" smtClean="0"/>
-              <a:t>22/07/2024</a:t>
+              <a:t>23/07/2024</a:t>
             </a:fld>
             <a:endParaRPr lang="en-US"/>
           </a:p>
@@ -615,7 +617,7 @@
           <a:p>
             <a:fld id="{4D508FE5-B1ED-486B-B74B-695E0C12B73B}" type="datetimeFigureOut">
               <a:rPr lang="en-US" smtClean="0"/>
-              <a:t>22/07/2024</a:t>
+              <a:t>23/07/2024</a:t>
             </a:fld>
             <a:endParaRPr lang="en-US"/>
           </a:p>
@@ -783,7 +785,7 @@
           <a:p>
             <a:fld id="{4D508FE5-B1ED-486B-B74B-695E0C12B73B}" type="datetimeFigureOut">
               <a:rPr lang="en-US" smtClean="0"/>
-              <a:t>22/07/2024</a:t>
+              <a:t>23/07/2024</a:t>
             </a:fld>
             <a:endParaRPr lang="en-US"/>
           </a:p>
@@ -1028,7 +1030,7 @@
           <a:p>
             <a:fld id="{4D508FE5-B1ED-486B-B74B-695E0C12B73B}" type="datetimeFigureOut">
               <a:rPr lang="en-US" smtClean="0"/>
-              <a:t>22/07/2024</a:t>
+              <a:t>23/07/2024</a:t>
             </a:fld>
             <a:endParaRPr lang="en-US"/>
           </a:p>
@@ -1257,7 +1259,7 @@
           <a:p>
             <a:fld id="{4D508FE5-B1ED-486B-B74B-695E0C12B73B}" type="datetimeFigureOut">
               <a:rPr lang="en-US" smtClean="0"/>
-              <a:t>22/07/2024</a:t>
+              <a:t>23/07/2024</a:t>
             </a:fld>
             <a:endParaRPr lang="en-US"/>
           </a:p>
@@ -1621,7 +1623,7 @@
           <a:p>
             <a:fld id="{4D508FE5-B1ED-486B-B74B-695E0C12B73B}" type="datetimeFigureOut">
               <a:rPr lang="en-US" smtClean="0"/>
-              <a:t>22/07/2024</a:t>
+              <a:t>23/07/2024</a:t>
             </a:fld>
             <a:endParaRPr lang="en-US"/>
           </a:p>
@@ -1738,7 +1740,7 @@
           <a:p>
             <a:fld id="{4D508FE5-B1ED-486B-B74B-695E0C12B73B}" type="datetimeFigureOut">
               <a:rPr lang="en-US" smtClean="0"/>
-              <a:t>22/07/2024</a:t>
+              <a:t>23/07/2024</a:t>
             </a:fld>
             <a:endParaRPr lang="en-US"/>
           </a:p>
@@ -1833,7 +1835,7 @@
           <a:p>
             <a:fld id="{4D508FE5-B1ED-486B-B74B-695E0C12B73B}" type="datetimeFigureOut">
               <a:rPr lang="en-US" smtClean="0"/>
-              <a:t>22/07/2024</a:t>
+              <a:t>23/07/2024</a:t>
             </a:fld>
             <a:endParaRPr lang="en-US"/>
           </a:p>
@@ -2108,7 +2110,7 @@
           <a:p>
             <a:fld id="{4D508FE5-B1ED-486B-B74B-695E0C12B73B}" type="datetimeFigureOut">
               <a:rPr lang="en-US" smtClean="0"/>
-              <a:t>22/07/2024</a:t>
+              <a:t>23/07/2024</a:t>
             </a:fld>
             <a:endParaRPr lang="en-US"/>
           </a:p>
@@ -2360,7 +2362,7 @@
           <a:p>
             <a:fld id="{4D508FE5-B1ED-486B-B74B-695E0C12B73B}" type="datetimeFigureOut">
               <a:rPr lang="en-US" smtClean="0"/>
-              <a:t>22/07/2024</a:t>
+              <a:t>23/07/2024</a:t>
             </a:fld>
             <a:endParaRPr lang="en-US"/>
           </a:p>
@@ -2571,7 +2573,7 @@
           <a:p>
             <a:fld id="{4D508FE5-B1ED-486B-B74B-695E0C12B73B}" type="datetimeFigureOut">
               <a:rPr lang="en-US" smtClean="0"/>
-              <a:t>22/07/2024</a:t>
+              <a:t>23/07/2024</a:t>
             </a:fld>
             <a:endParaRPr lang="en-US"/>
           </a:p>
@@ -5256,7 +5258,7 @@
         </p:blipFill>
         <p:spPr>
           <a:xfrm>
-            <a:off x="357608" y="194252"/>
+            <a:off x="393118" y="138767"/>
             <a:ext cx="9878804" cy="3877216"/>
           </a:xfrm>
           <a:prstGeom prst="rect">
@@ -5264,6 +5266,111 @@
           </a:prstGeom>
         </p:spPr>
       </p:pic>
+      <p:sp>
+        <p:nvSpPr>
+          <p:cNvPr id="3" name="TextBox 2">
+            <a:extLst>
+              <a:ext uri="{FF2B5EF4-FFF2-40B4-BE49-F238E27FC236}">
+                <a16:creationId xmlns:a16="http://schemas.microsoft.com/office/drawing/2014/main" id="{AC59871F-93C6-45CB-86C0-8BF78C1F4CDC}"/>
+              </a:ext>
+            </a:extLst>
+          </p:cNvPr>
+          <p:cNvSpPr txBox="1"/>
+          <p:nvPr/>
+        </p:nvSpPr>
+        <p:spPr>
+          <a:xfrm>
+            <a:off x="4341181" y="3222594"/>
+            <a:ext cx="2450236" cy="369332"/>
+          </a:xfrm>
+          <a:prstGeom prst="rect">
+            <a:avLst/>
+          </a:prstGeom>
+          <a:noFill/>
+        </p:spPr>
+        <p:txBody>
+          <a:bodyPr wrap="square" rtlCol="0">
+            <a:spAutoFit/>
+          </a:bodyPr>
+          <a:lstStyle/>
+          <a:p>
+            <a:r>
+              <a:rPr lang="en-US"/>
+              <a:t>Máy tính lớp trưởng</a:t>
+            </a:r>
+          </a:p>
+        </p:txBody>
+      </p:sp>
+      <p:sp>
+        <p:nvSpPr>
+          <p:cNvPr id="4" name="TextBox 3">
+            <a:extLst>
+              <a:ext uri="{FF2B5EF4-FFF2-40B4-BE49-F238E27FC236}">
+                <a16:creationId xmlns:a16="http://schemas.microsoft.com/office/drawing/2014/main" id="{3C57666D-3896-47F9-95D3-718CA8C24039}"/>
+              </a:ext>
+            </a:extLst>
+          </p:cNvPr>
+          <p:cNvSpPr txBox="1"/>
+          <p:nvPr/>
+        </p:nvSpPr>
+        <p:spPr>
+          <a:xfrm>
+            <a:off x="4323425" y="2077375"/>
+            <a:ext cx="1349406" cy="369332"/>
+          </a:xfrm>
+          <a:prstGeom prst="rect">
+            <a:avLst/>
+          </a:prstGeom>
+          <a:noFill/>
+        </p:spPr>
+        <p:txBody>
+          <a:bodyPr wrap="square" rtlCol="0">
+            <a:spAutoFit/>
+          </a:bodyPr>
+          <a:lstStyle/>
+          <a:p>
+            <a:r>
+              <a:rPr lang="en-US"/>
+              <a:t>Remote</a:t>
+            </a:r>
+          </a:p>
+        </p:txBody>
+      </p:sp>
+      <p:sp>
+        <p:nvSpPr>
+          <p:cNvPr id="5" name="TextBox 4">
+            <a:extLst>
+              <a:ext uri="{FF2B5EF4-FFF2-40B4-BE49-F238E27FC236}">
+                <a16:creationId xmlns:a16="http://schemas.microsoft.com/office/drawing/2014/main" id="{FB4BB4E1-4A19-4DB6-94F9-BA951CFE7C21}"/>
+              </a:ext>
+            </a:extLst>
+          </p:cNvPr>
+          <p:cNvSpPr txBox="1"/>
+          <p:nvPr/>
+        </p:nvSpPr>
+        <p:spPr>
+          <a:xfrm>
+            <a:off x="4509857" y="843379"/>
+            <a:ext cx="3338004" cy="369332"/>
+          </a:xfrm>
+          <a:prstGeom prst="rect">
+            <a:avLst/>
+          </a:prstGeom>
+          <a:noFill/>
+        </p:spPr>
+        <p:txBody>
+          <a:bodyPr wrap="square" rtlCol="0">
+            <a:spAutoFit/>
+          </a:bodyPr>
+          <a:lstStyle/>
+          <a:p>
+            <a:r>
+              <a:rPr lang="en-US"/>
+              <a:t>Máy tính của thành viên nhóm</a:t>
+            </a:r>
+          </a:p>
+        </p:txBody>
+      </p:sp>
     </p:spTree>
     <p:extLst>
       <p:ext uri="{BB962C8B-B14F-4D97-AF65-F5344CB8AC3E}">
@@ -5294,123 +5401,40 @@
           <a:chExt cx="0" cy="0"/>
         </a:xfrm>
       </p:grpSpPr>
-      <p:sp>
-        <p:nvSpPr>
-          <p:cNvPr id="2" name="TextBox 1">
+      <p:pic>
+        <p:nvPicPr>
+          <p:cNvPr id="2" name="Picture 1">
             <a:extLst>
               <a:ext uri="{FF2B5EF4-FFF2-40B4-BE49-F238E27FC236}">
-                <a16:creationId xmlns:a16="http://schemas.microsoft.com/office/drawing/2014/main" id="{6037E47F-2A45-4EA5-A1E1-ACD73B5AEBD6}"/>
+                <a16:creationId xmlns:a16="http://schemas.microsoft.com/office/drawing/2014/main" id="{B0B18184-5B52-4200-A3B8-B82D56C4AE15}"/>
               </a:ext>
             </a:extLst>
           </p:cNvPr>
-          <p:cNvSpPr txBox="1"/>
-          <p:nvPr/>
-        </p:nvSpPr>
-        <p:spPr>
-          <a:xfrm>
-            <a:off x="168675" y="147390"/>
-            <a:ext cx="7927760" cy="369332"/>
-          </a:xfrm>
-          <a:prstGeom prst="rect">
-            <a:avLst/>
-          </a:prstGeom>
-          <a:noFill/>
-        </p:spPr>
-        <p:txBody>
-          <a:bodyPr wrap="square" rtlCol="0">
-            <a:spAutoFit/>
-          </a:bodyPr>
-          <a:lstStyle/>
-          <a:p>
-            <a:r>
-              <a:rPr lang="en-US"/>
-              <a:t>Git Fetch: Lấy Code trên Remote về nh</a:t>
-            </a:r>
-            <a:r>
-              <a:rPr lang="vi-VN"/>
-              <a:t>ư</a:t>
-            </a:r>
-            <a:r>
-              <a:rPr lang="en-US"/>
-              <a:t>ng không làm thay đổi Code ở Local.</a:t>
-            </a:r>
-          </a:p>
-        </p:txBody>
-      </p:sp>
-      <p:sp>
-        <p:nvSpPr>
-          <p:cNvPr id="3" name="TextBox 2">
-            <a:extLst>
-              <a:ext uri="{FF2B5EF4-FFF2-40B4-BE49-F238E27FC236}">
-                <a16:creationId xmlns:a16="http://schemas.microsoft.com/office/drawing/2014/main" id="{623C4C6C-A1AD-4F7E-A468-103D0794523D}"/>
-              </a:ext>
-            </a:extLst>
-          </p:cNvPr>
-          <p:cNvSpPr txBox="1"/>
-          <p:nvPr/>
-        </p:nvSpPr>
-        <p:spPr>
-          <a:xfrm>
-            <a:off x="239697" y="516722"/>
-            <a:ext cx="2947386" cy="369332"/>
-          </a:xfrm>
-          <a:prstGeom prst="rect">
-            <a:avLst/>
-          </a:prstGeom>
-          <a:noFill/>
-        </p:spPr>
-        <p:txBody>
-          <a:bodyPr wrap="square" rtlCol="0">
-            <a:spAutoFit/>
-          </a:bodyPr>
-          <a:lstStyle/>
-          <a:p>
-            <a:r>
-              <a:rPr lang="en-US"/>
-              <a:t>Cú pháp: “ git fetch origin ”</a:t>
-            </a:r>
-          </a:p>
-        </p:txBody>
-      </p:sp>
-      <p:sp>
-        <p:nvSpPr>
-          <p:cNvPr id="4" name="TextBox 3">
-            <a:extLst>
-              <a:ext uri="{FF2B5EF4-FFF2-40B4-BE49-F238E27FC236}">
-                <a16:creationId xmlns:a16="http://schemas.microsoft.com/office/drawing/2014/main" id="{8A2BBF42-78E7-441E-ACEB-5456C8DDC245}"/>
-              </a:ext>
-            </a:extLst>
-          </p:cNvPr>
-          <p:cNvSpPr txBox="1"/>
-          <p:nvPr/>
-        </p:nvSpPr>
-        <p:spPr>
-          <a:xfrm>
-            <a:off x="239697" y="987186"/>
-            <a:ext cx="3480047" cy="369332"/>
-          </a:xfrm>
-          <a:prstGeom prst="rect">
-            <a:avLst/>
-          </a:prstGeom>
-          <a:noFill/>
-        </p:spPr>
-        <p:txBody>
-          <a:bodyPr wrap="square" rtlCol="0">
-            <a:spAutoFit/>
-          </a:bodyPr>
-          <a:lstStyle/>
-          <a:p>
-            <a:r>
-              <a:rPr lang="en-US"/>
-              <a:t>Chỉ lấy Code về mà ko merge</a:t>
-            </a:r>
-          </a:p>
-        </p:txBody>
-      </p:sp>
+          <p:cNvPicPr>
+            <a:picLocks noChangeAspect="1"/>
+          </p:cNvPicPr>
+          <p:nvPr/>
+        </p:nvPicPr>
+        <p:blipFill>
+          <a:blip r:embed="rId2"/>
+          <a:stretch>
+            <a:fillRect/>
+          </a:stretch>
+        </p:blipFill>
+        <p:spPr>
+          <a:xfrm>
+            <a:off x="460896" y="422070"/>
+            <a:ext cx="9974067" cy="4486901"/>
+          </a:xfrm>
+          <a:prstGeom prst="rect">
+            <a:avLst/>
+          </a:prstGeom>
+        </p:spPr>
+      </p:pic>
     </p:spTree>
     <p:extLst>
       <p:ext uri="{BB962C8B-B14F-4D97-AF65-F5344CB8AC3E}">
-        <p14:creationId xmlns:p14="http://schemas.microsoft.com/office/powerpoint/2010/main" val="4208621322"/>
+        <p14:creationId xmlns:p14="http://schemas.microsoft.com/office/powerpoint/2010/main" val="1539871790"/>
       </p:ext>
     </p:extLst>
   </p:cSld>
@@ -5964,6 +5988,380 @@
     </p:spTree>
     <p:extLst>
       <p:ext uri="{BB962C8B-B14F-4D97-AF65-F5344CB8AC3E}">
+        <p14:creationId xmlns:p14="http://schemas.microsoft.com/office/powerpoint/2010/main" val="3758875150"/>
+      </p:ext>
+    </p:extLst>
+  </p:cSld>
+  <p:clrMapOvr>
+    <a:masterClrMapping/>
+  </p:clrMapOvr>
+</p:sld>
+</file>
+
+<file path=ppt/slides/slide21.xml><?xml version="1.0" encoding="utf-8"?>
+<p:sld xmlns:a="http://schemas.openxmlformats.org/drawingml/2006/main" xmlns:r="http://schemas.openxmlformats.org/officeDocument/2006/relationships" xmlns:p="http://schemas.openxmlformats.org/presentationml/2006/main">
+  <p:cSld>
+    <p:spTree>
+      <p:nvGrpSpPr>
+        <p:cNvPr id="1" name=""/>
+        <p:cNvGrpSpPr/>
+        <p:nvPr/>
+      </p:nvGrpSpPr>
+      <p:grpSpPr>
+        <a:xfrm>
+          <a:off x="0" y="0"/>
+          <a:ext cx="0" cy="0"/>
+          <a:chOff x="0" y="0"/>
+          <a:chExt cx="0" cy="0"/>
+        </a:xfrm>
+      </p:grpSpPr>
+      <p:sp>
+        <p:nvSpPr>
+          <p:cNvPr id="2" name="TextBox 1">
+            <a:extLst>
+              <a:ext uri="{FF2B5EF4-FFF2-40B4-BE49-F238E27FC236}">
+                <a16:creationId xmlns:a16="http://schemas.microsoft.com/office/drawing/2014/main" id="{6037E47F-2A45-4EA5-A1E1-ACD73B5AEBD6}"/>
+              </a:ext>
+            </a:extLst>
+          </p:cNvPr>
+          <p:cNvSpPr txBox="1"/>
+          <p:nvPr/>
+        </p:nvSpPr>
+        <p:spPr>
+          <a:xfrm>
+            <a:off x="168675" y="147390"/>
+            <a:ext cx="7927760" cy="369332"/>
+          </a:xfrm>
+          <a:prstGeom prst="rect">
+            <a:avLst/>
+          </a:prstGeom>
+          <a:noFill/>
+        </p:spPr>
+        <p:txBody>
+          <a:bodyPr wrap="square" rtlCol="0">
+            <a:spAutoFit/>
+          </a:bodyPr>
+          <a:lstStyle/>
+          <a:p>
+            <a:r>
+              <a:rPr lang="en-US"/>
+              <a:t>Git Fetch: Lấy Code trên Remote về nh</a:t>
+            </a:r>
+            <a:r>
+              <a:rPr lang="vi-VN"/>
+              <a:t>ư</a:t>
+            </a:r>
+            <a:r>
+              <a:rPr lang="en-US"/>
+              <a:t>ng không làm thay đổi Code ở Local.</a:t>
+            </a:r>
+          </a:p>
+        </p:txBody>
+      </p:sp>
+      <p:sp>
+        <p:nvSpPr>
+          <p:cNvPr id="3" name="TextBox 2">
+            <a:extLst>
+              <a:ext uri="{FF2B5EF4-FFF2-40B4-BE49-F238E27FC236}">
+                <a16:creationId xmlns:a16="http://schemas.microsoft.com/office/drawing/2014/main" id="{623C4C6C-A1AD-4F7E-A468-103D0794523D}"/>
+              </a:ext>
+            </a:extLst>
+          </p:cNvPr>
+          <p:cNvSpPr txBox="1"/>
+          <p:nvPr/>
+        </p:nvSpPr>
+        <p:spPr>
+          <a:xfrm>
+            <a:off x="239697" y="516722"/>
+            <a:ext cx="2947386" cy="369332"/>
+          </a:xfrm>
+          <a:prstGeom prst="rect">
+            <a:avLst/>
+          </a:prstGeom>
+          <a:noFill/>
+        </p:spPr>
+        <p:txBody>
+          <a:bodyPr wrap="square" rtlCol="0">
+            <a:spAutoFit/>
+          </a:bodyPr>
+          <a:lstStyle/>
+          <a:p>
+            <a:r>
+              <a:rPr lang="en-US"/>
+              <a:t>Cú pháp: “ git fetch origin ”</a:t>
+            </a:r>
+          </a:p>
+        </p:txBody>
+      </p:sp>
+      <p:sp>
+        <p:nvSpPr>
+          <p:cNvPr id="4" name="TextBox 3">
+            <a:extLst>
+              <a:ext uri="{FF2B5EF4-FFF2-40B4-BE49-F238E27FC236}">
+                <a16:creationId xmlns:a16="http://schemas.microsoft.com/office/drawing/2014/main" id="{8A2BBF42-78E7-441E-ACEB-5456C8DDC245}"/>
+              </a:ext>
+            </a:extLst>
+          </p:cNvPr>
+          <p:cNvSpPr txBox="1"/>
+          <p:nvPr/>
+        </p:nvSpPr>
+        <p:spPr>
+          <a:xfrm>
+            <a:off x="239697" y="987186"/>
+            <a:ext cx="3480047" cy="369332"/>
+          </a:xfrm>
+          <a:prstGeom prst="rect">
+            <a:avLst/>
+          </a:prstGeom>
+          <a:noFill/>
+        </p:spPr>
+        <p:txBody>
+          <a:bodyPr wrap="square" rtlCol="0">
+            <a:spAutoFit/>
+          </a:bodyPr>
+          <a:lstStyle/>
+          <a:p>
+            <a:r>
+              <a:rPr lang="en-US"/>
+              <a:t>Chỉ lấy Code về mà ko merge</a:t>
+            </a:r>
+          </a:p>
+        </p:txBody>
+      </p:sp>
+    </p:spTree>
+    <p:extLst>
+      <p:ext uri="{BB962C8B-B14F-4D97-AF65-F5344CB8AC3E}">
+        <p14:creationId xmlns:p14="http://schemas.microsoft.com/office/powerpoint/2010/main" val="4208621322"/>
+      </p:ext>
+    </p:extLst>
+  </p:cSld>
+  <p:clrMapOvr>
+    <a:masterClrMapping/>
+  </p:clrMapOvr>
+</p:sld>
+</file>
+
+<file path=ppt/slides/slide22.xml><?xml version="1.0" encoding="utf-8"?>
+<p:sld xmlns:a="http://schemas.openxmlformats.org/drawingml/2006/main" xmlns:r="http://schemas.openxmlformats.org/officeDocument/2006/relationships" xmlns:p="http://schemas.openxmlformats.org/presentationml/2006/main">
+  <p:cSld>
+    <p:spTree>
+      <p:nvGrpSpPr>
+        <p:cNvPr id="1" name=""/>
+        <p:cNvGrpSpPr/>
+        <p:nvPr/>
+      </p:nvGrpSpPr>
+      <p:grpSpPr>
+        <a:xfrm>
+          <a:off x="0" y="0"/>
+          <a:ext cx="0" cy="0"/>
+          <a:chOff x="0" y="0"/>
+          <a:chExt cx="0" cy="0"/>
+        </a:xfrm>
+      </p:grpSpPr>
+      <p:sp>
+        <p:nvSpPr>
+          <p:cNvPr id="2" name="TextBox 1">
+            <a:extLst>
+              <a:ext uri="{FF2B5EF4-FFF2-40B4-BE49-F238E27FC236}">
+                <a16:creationId xmlns:a16="http://schemas.microsoft.com/office/drawing/2014/main" id="{EC33F701-70DE-411A-8BB2-85C3CC7DDD34}"/>
+              </a:ext>
+            </a:extLst>
+          </p:cNvPr>
+          <p:cNvSpPr txBox="1"/>
+          <p:nvPr/>
+        </p:nvSpPr>
+        <p:spPr>
+          <a:xfrm>
+            <a:off x="124287" y="111274"/>
+            <a:ext cx="2148396" cy="369332"/>
+          </a:xfrm>
+          <a:prstGeom prst="rect">
+            <a:avLst/>
+          </a:prstGeom>
+          <a:noFill/>
+        </p:spPr>
+        <p:txBody>
+          <a:bodyPr wrap="square" rtlCol="0">
+            <a:spAutoFit/>
+          </a:bodyPr>
+          <a:lstStyle/>
+          <a:p>
+            <a:r>
+              <a:rPr lang="en-US"/>
+              <a:t>Git merge</a:t>
+            </a:r>
+          </a:p>
+        </p:txBody>
+      </p:sp>
+      <p:pic>
+        <p:nvPicPr>
+          <p:cNvPr id="4" name="Picture 3">
+            <a:extLst>
+              <a:ext uri="{FF2B5EF4-FFF2-40B4-BE49-F238E27FC236}">
+                <a16:creationId xmlns:a16="http://schemas.microsoft.com/office/drawing/2014/main" id="{C8ADBB51-87A8-4C66-AC69-E987524B81D6}"/>
+              </a:ext>
+            </a:extLst>
+          </p:cNvPr>
+          <p:cNvPicPr>
+            <a:picLocks noChangeAspect="1"/>
+          </p:cNvPicPr>
+          <p:nvPr/>
+        </p:nvPicPr>
+        <p:blipFill>
+          <a:blip r:embed="rId2"/>
+          <a:stretch>
+            <a:fillRect/>
+          </a:stretch>
+        </p:blipFill>
+        <p:spPr>
+          <a:xfrm>
+            <a:off x="124287" y="480606"/>
+            <a:ext cx="3096057" cy="657317"/>
+          </a:xfrm>
+          <a:prstGeom prst="rect">
+            <a:avLst/>
+          </a:prstGeom>
+        </p:spPr>
+      </p:pic>
+      <p:sp>
+        <p:nvSpPr>
+          <p:cNvPr id="5" name="TextBox 4">
+            <a:extLst>
+              <a:ext uri="{FF2B5EF4-FFF2-40B4-BE49-F238E27FC236}">
+                <a16:creationId xmlns:a16="http://schemas.microsoft.com/office/drawing/2014/main" id="{8E683996-57B3-4E81-9983-B8D0283178BE}"/>
+              </a:ext>
+            </a:extLst>
+          </p:cNvPr>
+          <p:cNvSpPr txBox="1"/>
+          <p:nvPr/>
+        </p:nvSpPr>
+        <p:spPr>
+          <a:xfrm>
+            <a:off x="3400148" y="480606"/>
+            <a:ext cx="5672830" cy="646331"/>
+          </a:xfrm>
+          <a:prstGeom prst="rect">
+            <a:avLst/>
+          </a:prstGeom>
+          <a:noFill/>
+        </p:spPr>
+        <p:txBody>
+          <a:bodyPr wrap="square" rtlCol="0">
+            <a:spAutoFit/>
+          </a:bodyPr>
+          <a:lstStyle/>
+          <a:p>
+            <a:r>
+              <a:rPr lang="en-US"/>
+              <a:t>Cú pháp “ git merge + tên nhánh”, ý nghĩa là gộp nhánh đó vào nhánh hiện tại</a:t>
+            </a:r>
+          </a:p>
+        </p:txBody>
+      </p:sp>
+      <p:pic>
+        <p:nvPicPr>
+          <p:cNvPr id="6" name="Picture 5">
+            <a:extLst>
+              <a:ext uri="{FF2B5EF4-FFF2-40B4-BE49-F238E27FC236}">
+                <a16:creationId xmlns:a16="http://schemas.microsoft.com/office/drawing/2014/main" id="{69E10C23-522A-4FC8-8DA5-6CA9953D4A25}"/>
+              </a:ext>
+            </a:extLst>
+          </p:cNvPr>
+          <p:cNvPicPr>
+            <a:picLocks noChangeAspect="1"/>
+          </p:cNvPicPr>
+          <p:nvPr/>
+        </p:nvPicPr>
+        <p:blipFill>
+          <a:blip r:embed="rId3"/>
+          <a:stretch>
+            <a:fillRect/>
+          </a:stretch>
+        </p:blipFill>
+        <p:spPr>
+          <a:xfrm>
+            <a:off x="124287" y="1239344"/>
+            <a:ext cx="6818051" cy="2116415"/>
+          </a:xfrm>
+          <a:prstGeom prst="rect">
+            <a:avLst/>
+          </a:prstGeom>
+        </p:spPr>
+      </p:pic>
+      <p:pic>
+        <p:nvPicPr>
+          <p:cNvPr id="7" name="Picture 6">
+            <a:extLst>
+              <a:ext uri="{FF2B5EF4-FFF2-40B4-BE49-F238E27FC236}">
+                <a16:creationId xmlns:a16="http://schemas.microsoft.com/office/drawing/2014/main" id="{9790B743-0629-46CA-94FF-0CBECD87CC90}"/>
+              </a:ext>
+            </a:extLst>
+          </p:cNvPr>
+          <p:cNvPicPr>
+            <a:picLocks noChangeAspect="1"/>
+          </p:cNvPicPr>
+          <p:nvPr/>
+        </p:nvPicPr>
+        <p:blipFill>
+          <a:blip r:embed="rId4"/>
+          <a:stretch>
+            <a:fillRect/>
+          </a:stretch>
+        </p:blipFill>
+        <p:spPr>
+          <a:xfrm>
+            <a:off x="127854" y="4363215"/>
+            <a:ext cx="6814484" cy="2286319"/>
+          </a:xfrm>
+          <a:prstGeom prst="rect">
+            <a:avLst/>
+          </a:prstGeom>
+        </p:spPr>
+      </p:pic>
+      <p:cxnSp>
+        <p:nvCxnSpPr>
+          <p:cNvPr id="9" name="Straight Arrow Connector 8">
+            <a:extLst>
+              <a:ext uri="{FF2B5EF4-FFF2-40B4-BE49-F238E27FC236}">
+                <a16:creationId xmlns:a16="http://schemas.microsoft.com/office/drawing/2014/main" id="{DAC1D9B0-1620-46C6-BF42-0B07BFFFF7A6}"/>
+              </a:ext>
+            </a:extLst>
+          </p:cNvPr>
+          <p:cNvCxnSpPr>
+            <a:cxnSpLocks/>
+          </p:cNvCxnSpPr>
+          <p:nvPr/>
+        </p:nvCxnSpPr>
+        <p:spPr>
+          <a:xfrm>
+            <a:off x="2476870" y="3355759"/>
+            <a:ext cx="0" cy="994299"/>
+          </a:xfrm>
+          <a:prstGeom prst="straightConnector1">
+            <a:avLst/>
+          </a:prstGeom>
+          <a:ln>
+            <a:tailEnd type="triangle"/>
+          </a:ln>
+        </p:spPr>
+        <p:style>
+          <a:lnRef idx="1">
+            <a:schemeClr val="accent2"/>
+          </a:lnRef>
+          <a:fillRef idx="0">
+            <a:schemeClr val="accent2"/>
+          </a:fillRef>
+          <a:effectRef idx="0">
+            <a:schemeClr val="accent2"/>
+          </a:effectRef>
+          <a:fontRef idx="minor">
+            <a:schemeClr val="tx1"/>
+          </a:fontRef>
+        </p:style>
+      </p:cxnSp>
+    </p:spTree>
+    <p:extLst>
+      <p:ext uri="{BB962C8B-B14F-4D97-AF65-F5344CB8AC3E}">
         <p14:creationId xmlns:p14="http://schemas.microsoft.com/office/powerpoint/2010/main" val="15732575"/>
       </p:ext>
     </p:extLst>
@@ -5974,7 +6372,7 @@
 </p:sld>
 </file>
 
-<file path=ppt/slides/slide21.xml><?xml version="1.0" encoding="utf-8"?>
+<file path=ppt/slides/slide23.xml><?xml version="1.0" encoding="utf-8"?>
 <p:sld xmlns:a="http://schemas.openxmlformats.org/drawingml/2006/main" xmlns:r="http://schemas.openxmlformats.org/officeDocument/2006/relationships" xmlns:p="http://schemas.openxmlformats.org/presentationml/2006/main">
   <p:cSld>
     <p:spTree>
@@ -6004,7 +6402,7 @@
 </p:sld>
 </file>
 
-<file path=ppt/slides/slide22.xml><?xml version="1.0" encoding="utf-8"?>
+<file path=ppt/slides/slide24.xml><?xml version="1.0" encoding="utf-8"?>
 <p:sld xmlns:a="http://schemas.openxmlformats.org/drawingml/2006/main" xmlns:r="http://schemas.openxmlformats.org/officeDocument/2006/relationships" xmlns:p="http://schemas.openxmlformats.org/presentationml/2006/main">
   <p:cSld>
     <p:spTree>
@@ -6034,1463 +6432,6 @@
 </p:sld>
 </file>
 
-<file path=ppt/slides/slide23.xml><?xml version="1.0" encoding="utf-8"?>
-<p:sld xmlns:a="http://schemas.openxmlformats.org/drawingml/2006/main" xmlns:r="http://schemas.openxmlformats.org/officeDocument/2006/relationships" xmlns:p="http://schemas.openxmlformats.org/presentationml/2006/main">
-  <p:cSld>
-    <p:spTree>
-      <p:nvGrpSpPr>
-        <p:cNvPr id="1" name=""/>
-        <p:cNvGrpSpPr/>
-        <p:nvPr/>
-      </p:nvGrpSpPr>
-      <p:grpSpPr>
-        <a:xfrm>
-          <a:off x="0" y="0"/>
-          <a:ext cx="0" cy="0"/>
-          <a:chOff x="0" y="0"/>
-          <a:chExt cx="0" cy="0"/>
-        </a:xfrm>
-      </p:grpSpPr>
-      <p:sp>
-        <p:nvSpPr>
-          <p:cNvPr id="2" name="TextBox 1"/>
-          <p:cNvSpPr txBox="1"/>
-          <p:nvPr/>
-        </p:nvSpPr>
-        <p:spPr>
-          <a:xfrm>
-            <a:off x="254976" y="153504"/>
-            <a:ext cx="11702562" cy="6418385"/>
-          </a:xfrm>
-          <a:prstGeom prst="rect">
-            <a:avLst/>
-          </a:prstGeom>
-          <a:noFill/>
-        </p:spPr>
-        <p:txBody>
-          <a:bodyPr wrap="square" rtlCol="0">
-            <a:spAutoFit/>
-          </a:bodyPr>
-          <a:lstStyle/>
-          <a:p>
-            <a:endParaRPr lang="en-US" dirty="0"/>
-          </a:p>
-        </p:txBody>
-      </p:sp>
-      <p:pic>
-        <p:nvPicPr>
-          <p:cNvPr id="3" name="Picture 2"/>
-          <p:cNvPicPr>
-            <a:picLocks noChangeAspect="1"/>
-          </p:cNvPicPr>
-          <p:nvPr/>
-        </p:nvPicPr>
-        <p:blipFill>
-          <a:blip r:embed="rId2"/>
-          <a:stretch>
-            <a:fillRect/>
-          </a:stretch>
-        </p:blipFill>
-        <p:spPr>
-          <a:xfrm>
-            <a:off x="861645" y="562709"/>
-            <a:ext cx="11095893" cy="5495192"/>
-          </a:xfrm>
-          <a:prstGeom prst="rect">
-            <a:avLst/>
-          </a:prstGeom>
-        </p:spPr>
-      </p:pic>
-      <p:pic>
-        <p:nvPicPr>
-          <p:cNvPr id="5" name="Picture 4"/>
-          <p:cNvPicPr>
-            <a:picLocks noChangeAspect="1"/>
-          </p:cNvPicPr>
-          <p:nvPr/>
-        </p:nvPicPr>
-        <p:blipFill>
-          <a:blip r:embed="rId3"/>
-          <a:stretch>
-            <a:fillRect/>
-          </a:stretch>
-        </p:blipFill>
-        <p:spPr>
-          <a:xfrm>
-            <a:off x="193431" y="5034782"/>
-            <a:ext cx="1629002" cy="628738"/>
-          </a:xfrm>
-          <a:prstGeom prst="rect">
-            <a:avLst/>
-          </a:prstGeom>
-        </p:spPr>
-      </p:pic>
-      <p:cxnSp>
-        <p:nvCxnSpPr>
-          <p:cNvPr id="7" name="Straight Arrow Connector 6"/>
-          <p:cNvCxnSpPr/>
-          <p:nvPr/>
-        </p:nvCxnSpPr>
-        <p:spPr>
-          <a:xfrm flipV="1">
-            <a:off x="1069477" y="4457701"/>
-            <a:ext cx="1172561" cy="628562"/>
-          </a:xfrm>
-          <a:prstGeom prst="straightConnector1">
-            <a:avLst/>
-          </a:prstGeom>
-          <a:ln>
-            <a:tailEnd type="triangle"/>
-          </a:ln>
-        </p:spPr>
-        <p:style>
-          <a:lnRef idx="1">
-            <a:schemeClr val="accent1"/>
-          </a:lnRef>
-          <a:fillRef idx="0">
-            <a:schemeClr val="accent1"/>
-          </a:fillRef>
-          <a:effectRef idx="0">
-            <a:schemeClr val="accent1"/>
-          </a:effectRef>
-          <a:fontRef idx="minor">
-            <a:schemeClr val="tx1"/>
-          </a:fontRef>
-        </p:style>
-      </p:cxnSp>
-      <p:sp>
-        <p:nvSpPr>
-          <p:cNvPr id="9" name="TextBox 8"/>
-          <p:cNvSpPr txBox="1"/>
-          <p:nvPr/>
-        </p:nvSpPr>
-        <p:spPr>
-          <a:xfrm>
-            <a:off x="254976" y="4340971"/>
-            <a:ext cx="1629002" cy="577081"/>
-          </a:xfrm>
-          <a:prstGeom prst="rect">
-            <a:avLst/>
-          </a:prstGeom>
-          <a:noFill/>
-        </p:spPr>
-        <p:txBody>
-          <a:bodyPr wrap="square" rtlCol="0">
-            <a:spAutoFit/>
-          </a:bodyPr>
-          <a:lstStyle/>
-          <a:p>
-            <a:r>
-              <a:rPr lang="en-US" sz="1050" dirty="0" err="1">
-                <a:latin typeface="Times New Roman" panose="02020603050405020304" pitchFamily="18" charset="0"/>
-                <a:cs typeface="Times New Roman" panose="02020603050405020304" pitchFamily="18" charset="0"/>
-              </a:rPr>
-              <a:t>Hiện</a:t>
-            </a:r>
-            <a:r>
-              <a:rPr lang="en-US" sz="1050" dirty="0">
-                <a:latin typeface="Times New Roman" panose="02020603050405020304" pitchFamily="18" charset="0"/>
-                <a:cs typeface="Times New Roman" panose="02020603050405020304" pitchFamily="18" charset="0"/>
-              </a:rPr>
-              <a:t> </a:t>
-            </a:r>
-            <a:r>
-              <a:rPr lang="en-US" sz="1050" dirty="0" err="1">
-                <a:latin typeface="Times New Roman" panose="02020603050405020304" pitchFamily="18" charset="0"/>
-                <a:cs typeface="Times New Roman" panose="02020603050405020304" pitchFamily="18" charset="0"/>
-              </a:rPr>
-              <a:t>màu</a:t>
-            </a:r>
-            <a:r>
-              <a:rPr lang="en-US" sz="1050" dirty="0">
-                <a:latin typeface="Times New Roman" panose="02020603050405020304" pitchFamily="18" charset="0"/>
-                <a:cs typeface="Times New Roman" panose="02020603050405020304" pitchFamily="18" charset="0"/>
-              </a:rPr>
-              <a:t> </a:t>
-            </a:r>
-            <a:r>
-              <a:rPr lang="en-US" sz="1050" dirty="0" err="1">
-                <a:latin typeface="Times New Roman" panose="02020603050405020304" pitchFamily="18" charset="0"/>
-                <a:cs typeface="Times New Roman" panose="02020603050405020304" pitchFamily="18" charset="0"/>
-              </a:rPr>
-              <a:t>đỏ</a:t>
-            </a:r>
-            <a:r>
-              <a:rPr lang="en-US" sz="1050" dirty="0">
-                <a:latin typeface="Times New Roman" panose="02020603050405020304" pitchFamily="18" charset="0"/>
-                <a:cs typeface="Times New Roman" panose="02020603050405020304" pitchFamily="18" charset="0"/>
-              </a:rPr>
-              <a:t> </a:t>
-            </a:r>
-            <a:r>
-              <a:rPr lang="en-US" sz="1050" dirty="0" err="1">
-                <a:latin typeface="Times New Roman" panose="02020603050405020304" pitchFamily="18" charset="0"/>
-                <a:cs typeface="Times New Roman" panose="02020603050405020304" pitchFamily="18" charset="0"/>
-              </a:rPr>
-              <a:t>nghĩa</a:t>
-            </a:r>
-            <a:r>
-              <a:rPr lang="en-US" sz="1050" dirty="0">
-                <a:latin typeface="Times New Roman" panose="02020603050405020304" pitchFamily="18" charset="0"/>
-                <a:cs typeface="Times New Roman" panose="02020603050405020304" pitchFamily="18" charset="0"/>
-              </a:rPr>
-              <a:t> </a:t>
-            </a:r>
-            <a:r>
-              <a:rPr lang="en-US" sz="1050" dirty="0" err="1">
-                <a:latin typeface="Times New Roman" panose="02020603050405020304" pitchFamily="18" charset="0"/>
-                <a:cs typeface="Times New Roman" panose="02020603050405020304" pitchFamily="18" charset="0"/>
-              </a:rPr>
-              <a:t>là</a:t>
-            </a:r>
-            <a:r>
-              <a:rPr lang="en-US" sz="1050" dirty="0">
-                <a:latin typeface="Times New Roman" panose="02020603050405020304" pitchFamily="18" charset="0"/>
-                <a:cs typeface="Times New Roman" panose="02020603050405020304" pitchFamily="18" charset="0"/>
-              </a:rPr>
-              <a:t> File </a:t>
-            </a:r>
-            <a:r>
-              <a:rPr lang="en-US" sz="1050" dirty="0" err="1">
-                <a:latin typeface="Times New Roman" panose="02020603050405020304" pitchFamily="18" charset="0"/>
-                <a:cs typeface="Times New Roman" panose="02020603050405020304" pitchFamily="18" charset="0"/>
-              </a:rPr>
-              <a:t>mới</a:t>
-            </a:r>
-            <a:r>
-              <a:rPr lang="en-US" sz="1050" dirty="0">
-                <a:latin typeface="Times New Roman" panose="02020603050405020304" pitchFamily="18" charset="0"/>
-                <a:cs typeface="Times New Roman" panose="02020603050405020304" pitchFamily="18" charset="0"/>
-              </a:rPr>
-              <a:t> them </a:t>
-            </a:r>
-            <a:r>
-              <a:rPr lang="en-US" sz="1050" dirty="0" err="1">
-                <a:latin typeface="Times New Roman" panose="02020603050405020304" pitchFamily="18" charset="0"/>
-                <a:cs typeface="Times New Roman" panose="02020603050405020304" pitchFamily="18" charset="0"/>
-              </a:rPr>
-              <a:t>chưa</a:t>
-            </a:r>
-            <a:r>
-              <a:rPr lang="en-US" sz="1050" dirty="0">
-                <a:latin typeface="Times New Roman" panose="02020603050405020304" pitchFamily="18" charset="0"/>
-                <a:cs typeface="Times New Roman" panose="02020603050405020304" pitchFamily="18" charset="0"/>
-              </a:rPr>
-              <a:t> </a:t>
-            </a:r>
-            <a:r>
-              <a:rPr lang="en-US" sz="1050" dirty="0" err="1">
-                <a:latin typeface="Times New Roman" panose="02020603050405020304" pitchFamily="18" charset="0"/>
-                <a:cs typeface="Times New Roman" panose="02020603050405020304" pitchFamily="18" charset="0"/>
-              </a:rPr>
-              <a:t>được</a:t>
-            </a:r>
-            <a:r>
-              <a:rPr lang="en-US" sz="1050" dirty="0">
-                <a:latin typeface="Times New Roman" panose="02020603050405020304" pitchFamily="18" charset="0"/>
-                <a:cs typeface="Times New Roman" panose="02020603050405020304" pitchFamily="18" charset="0"/>
-              </a:rPr>
-              <a:t> </a:t>
-            </a:r>
-            <a:r>
-              <a:rPr lang="en-US" sz="1050" dirty="0" err="1">
-                <a:latin typeface="Times New Roman" panose="02020603050405020304" pitchFamily="18" charset="0"/>
-                <a:cs typeface="Times New Roman" panose="02020603050405020304" pitchFamily="18" charset="0"/>
-              </a:rPr>
-              <a:t>kiểm</a:t>
-            </a:r>
-            <a:r>
-              <a:rPr lang="en-US" sz="1050" dirty="0">
-                <a:latin typeface="Times New Roman" panose="02020603050405020304" pitchFamily="18" charset="0"/>
-                <a:cs typeface="Times New Roman" panose="02020603050405020304" pitchFamily="18" charset="0"/>
-              </a:rPr>
-              <a:t> </a:t>
-            </a:r>
-            <a:r>
-              <a:rPr lang="en-US" sz="1050" dirty="0" err="1">
-                <a:latin typeface="Times New Roman" panose="02020603050405020304" pitchFamily="18" charset="0"/>
-                <a:cs typeface="Times New Roman" panose="02020603050405020304" pitchFamily="18" charset="0"/>
-              </a:rPr>
-              <a:t>soát</a:t>
-            </a:r>
-            <a:endParaRPr lang="en-US" sz="1050" dirty="0">
-              <a:latin typeface="Times New Roman" panose="02020603050405020304" pitchFamily="18" charset="0"/>
-              <a:cs typeface="Times New Roman" panose="02020603050405020304" pitchFamily="18" charset="0"/>
-            </a:endParaRPr>
-          </a:p>
-        </p:txBody>
-      </p:sp>
-      <p:sp>
-        <p:nvSpPr>
-          <p:cNvPr id="10" name="TextBox 9"/>
-          <p:cNvSpPr txBox="1"/>
-          <p:nvPr/>
-        </p:nvSpPr>
-        <p:spPr>
-          <a:xfrm>
-            <a:off x="3021367" y="5241860"/>
-            <a:ext cx="2540979" cy="461665"/>
-          </a:xfrm>
-          <a:prstGeom prst="rect">
-            <a:avLst/>
-          </a:prstGeom>
-          <a:noFill/>
-        </p:spPr>
-        <p:txBody>
-          <a:bodyPr wrap="square" rtlCol="0">
-            <a:spAutoFit/>
-          </a:bodyPr>
-          <a:lstStyle/>
-          <a:p>
-            <a:r>
-              <a:rPr lang="en-US" sz="1200" dirty="0" err="1">
-                <a:solidFill>
-                  <a:srgbClr val="FF0000"/>
-                </a:solidFill>
-                <a:latin typeface="Times New Roman" panose="02020603050405020304" pitchFamily="18" charset="0"/>
-                <a:cs typeface="Times New Roman" panose="02020603050405020304" pitchFamily="18" charset="0"/>
-              </a:rPr>
-              <a:t>Sau</a:t>
-            </a:r>
-            <a:r>
-              <a:rPr lang="en-US" sz="1200" dirty="0">
-                <a:solidFill>
-                  <a:srgbClr val="FF0000"/>
-                </a:solidFill>
-                <a:latin typeface="Times New Roman" panose="02020603050405020304" pitchFamily="18" charset="0"/>
-                <a:cs typeface="Times New Roman" panose="02020603050405020304" pitchFamily="18" charset="0"/>
-              </a:rPr>
-              <a:t> </a:t>
-            </a:r>
-            <a:r>
-              <a:rPr lang="en-US" sz="1200" dirty="0" err="1">
-                <a:solidFill>
-                  <a:srgbClr val="FF0000"/>
-                </a:solidFill>
-                <a:latin typeface="Times New Roman" panose="02020603050405020304" pitchFamily="18" charset="0"/>
-                <a:cs typeface="Times New Roman" panose="02020603050405020304" pitchFamily="18" charset="0"/>
-              </a:rPr>
-              <a:t>khi</a:t>
-            </a:r>
-            <a:r>
-              <a:rPr lang="en-US" sz="1200" dirty="0">
-                <a:solidFill>
-                  <a:srgbClr val="FF0000"/>
-                </a:solidFill>
-                <a:latin typeface="Times New Roman" panose="02020603050405020304" pitchFamily="18" charset="0"/>
-                <a:cs typeface="Times New Roman" panose="02020603050405020304" pitchFamily="18" charset="0"/>
-              </a:rPr>
-              <a:t> </a:t>
-            </a:r>
-            <a:r>
-              <a:rPr lang="en-US" sz="1200" dirty="0" err="1">
-                <a:solidFill>
-                  <a:srgbClr val="FF0000"/>
-                </a:solidFill>
-                <a:latin typeface="Times New Roman" panose="02020603050405020304" pitchFamily="18" charset="0"/>
-                <a:cs typeface="Times New Roman" panose="02020603050405020304" pitchFamily="18" charset="0"/>
-              </a:rPr>
-              <a:t>gõ</a:t>
-            </a:r>
-            <a:r>
-              <a:rPr lang="en-US" sz="1200" dirty="0">
-                <a:solidFill>
-                  <a:srgbClr val="FF0000"/>
-                </a:solidFill>
-                <a:latin typeface="Times New Roman" panose="02020603050405020304" pitchFamily="18" charset="0"/>
-                <a:cs typeface="Times New Roman" panose="02020603050405020304" pitchFamily="18" charset="0"/>
-              </a:rPr>
-              <a:t> </a:t>
-            </a:r>
-            <a:r>
-              <a:rPr lang="en-US" sz="1200" dirty="0" err="1">
-                <a:solidFill>
-                  <a:srgbClr val="FF0000"/>
-                </a:solidFill>
-                <a:latin typeface="Times New Roman" panose="02020603050405020304" pitchFamily="18" charset="0"/>
-                <a:cs typeface="Times New Roman" panose="02020603050405020304" pitchFamily="18" charset="0"/>
-              </a:rPr>
-              <a:t>chuyển</a:t>
-            </a:r>
-            <a:r>
-              <a:rPr lang="en-US" sz="1200" dirty="0">
-                <a:solidFill>
-                  <a:srgbClr val="FF0000"/>
-                </a:solidFill>
-                <a:latin typeface="Times New Roman" panose="02020603050405020304" pitchFamily="18" charset="0"/>
-                <a:cs typeface="Times New Roman" panose="02020603050405020304" pitchFamily="18" charset="0"/>
-              </a:rPr>
-              <a:t> qua </a:t>
-            </a:r>
-            <a:r>
-              <a:rPr lang="en-US" sz="1200" dirty="0" err="1">
-                <a:solidFill>
-                  <a:srgbClr val="FF0000"/>
-                </a:solidFill>
-                <a:latin typeface="Times New Roman" panose="02020603050405020304" pitchFamily="18" charset="0"/>
-                <a:cs typeface="Times New Roman" panose="02020603050405020304" pitchFamily="18" charset="0"/>
-              </a:rPr>
-              <a:t>trạng</a:t>
-            </a:r>
-            <a:r>
-              <a:rPr lang="en-US" sz="1200" dirty="0">
-                <a:solidFill>
-                  <a:srgbClr val="FF0000"/>
-                </a:solidFill>
-                <a:latin typeface="Times New Roman" panose="02020603050405020304" pitchFamily="18" charset="0"/>
-                <a:cs typeface="Times New Roman" panose="02020603050405020304" pitchFamily="18" charset="0"/>
-              </a:rPr>
-              <a:t> </a:t>
-            </a:r>
-            <a:r>
-              <a:rPr lang="en-US" sz="1200" dirty="0" err="1">
-                <a:solidFill>
-                  <a:srgbClr val="FF0000"/>
-                </a:solidFill>
-                <a:latin typeface="Times New Roman" panose="02020603050405020304" pitchFamily="18" charset="0"/>
-                <a:cs typeface="Times New Roman" panose="02020603050405020304" pitchFamily="18" charset="0"/>
-              </a:rPr>
-              <a:t>thái</a:t>
-            </a:r>
-            <a:r>
-              <a:rPr lang="en-US" sz="1200" dirty="0">
-                <a:solidFill>
-                  <a:srgbClr val="FF0000"/>
-                </a:solidFill>
-                <a:latin typeface="Times New Roman" panose="02020603050405020304" pitchFamily="18" charset="0"/>
-                <a:cs typeface="Times New Roman" panose="02020603050405020304" pitchFamily="18" charset="0"/>
-              </a:rPr>
-              <a:t> </a:t>
-            </a:r>
-            <a:r>
-              <a:rPr lang="en-US" sz="1200" dirty="0" err="1">
-                <a:solidFill>
-                  <a:srgbClr val="FF0000"/>
-                </a:solidFill>
-                <a:latin typeface="Times New Roman" panose="02020603050405020304" pitchFamily="18" charset="0"/>
-                <a:cs typeface="Times New Roman" panose="02020603050405020304" pitchFamily="18" charset="0"/>
-              </a:rPr>
-              <a:t>màu</a:t>
-            </a:r>
-            <a:r>
-              <a:rPr lang="en-US" sz="1200" dirty="0">
-                <a:solidFill>
-                  <a:srgbClr val="FF0000"/>
-                </a:solidFill>
-                <a:latin typeface="Times New Roman" panose="02020603050405020304" pitchFamily="18" charset="0"/>
-                <a:cs typeface="Times New Roman" panose="02020603050405020304" pitchFamily="18" charset="0"/>
-              </a:rPr>
-              <a:t> </a:t>
-            </a:r>
-            <a:r>
-              <a:rPr lang="en-US" sz="1200" dirty="0" err="1">
-                <a:solidFill>
-                  <a:srgbClr val="FF0000"/>
-                </a:solidFill>
-                <a:latin typeface="Times New Roman" panose="02020603050405020304" pitchFamily="18" charset="0"/>
-                <a:cs typeface="Times New Roman" panose="02020603050405020304" pitchFamily="18" charset="0"/>
-              </a:rPr>
-              <a:t>xanh</a:t>
-            </a:r>
-            <a:r>
-              <a:rPr lang="en-US" sz="1200" dirty="0">
-                <a:solidFill>
-                  <a:srgbClr val="FF0000"/>
-                </a:solidFill>
-                <a:latin typeface="Times New Roman" panose="02020603050405020304" pitchFamily="18" charset="0"/>
-                <a:cs typeface="Times New Roman" panose="02020603050405020304" pitchFamily="18" charset="0"/>
-              </a:rPr>
-              <a:t>( File </a:t>
-            </a:r>
-            <a:r>
-              <a:rPr lang="en-US" sz="1200" dirty="0" err="1">
-                <a:solidFill>
-                  <a:srgbClr val="FF0000"/>
-                </a:solidFill>
-                <a:latin typeface="Times New Roman" panose="02020603050405020304" pitchFamily="18" charset="0"/>
-                <a:cs typeface="Times New Roman" panose="02020603050405020304" pitchFamily="18" charset="0"/>
-              </a:rPr>
-              <a:t>mới</a:t>
-            </a:r>
-            <a:r>
-              <a:rPr lang="en-US" sz="1200" dirty="0">
-                <a:solidFill>
-                  <a:srgbClr val="FF0000"/>
-                </a:solidFill>
-                <a:latin typeface="Times New Roman" panose="02020603050405020304" pitchFamily="18" charset="0"/>
-                <a:cs typeface="Times New Roman" panose="02020603050405020304" pitchFamily="18" charset="0"/>
-              </a:rPr>
-              <a:t> </a:t>
-            </a:r>
-            <a:r>
-              <a:rPr lang="en-US" sz="1200" dirty="0" err="1">
-                <a:solidFill>
-                  <a:srgbClr val="FF0000"/>
-                </a:solidFill>
-                <a:latin typeface="Times New Roman" panose="02020603050405020304" pitchFamily="18" charset="0"/>
-                <a:cs typeface="Times New Roman" panose="02020603050405020304" pitchFamily="18" charset="0"/>
-              </a:rPr>
-              <a:t>đã</a:t>
-            </a:r>
-            <a:r>
-              <a:rPr lang="en-US" sz="1200" dirty="0">
-                <a:solidFill>
-                  <a:srgbClr val="FF0000"/>
-                </a:solidFill>
-                <a:latin typeface="Times New Roman" panose="02020603050405020304" pitchFamily="18" charset="0"/>
-                <a:cs typeface="Times New Roman" panose="02020603050405020304" pitchFamily="18" charset="0"/>
-              </a:rPr>
-              <a:t> </a:t>
-            </a:r>
-            <a:r>
-              <a:rPr lang="en-US" sz="1200" dirty="0" err="1">
-                <a:solidFill>
-                  <a:srgbClr val="FF0000"/>
-                </a:solidFill>
-                <a:latin typeface="Times New Roman" panose="02020603050405020304" pitchFamily="18" charset="0"/>
-                <a:cs typeface="Times New Roman" panose="02020603050405020304" pitchFamily="18" charset="0"/>
-              </a:rPr>
-              <a:t>được</a:t>
-            </a:r>
-            <a:r>
-              <a:rPr lang="en-US" sz="1200" dirty="0">
-                <a:solidFill>
-                  <a:srgbClr val="FF0000"/>
-                </a:solidFill>
-                <a:latin typeface="Times New Roman" panose="02020603050405020304" pitchFamily="18" charset="0"/>
-                <a:cs typeface="Times New Roman" panose="02020603050405020304" pitchFamily="18" charset="0"/>
-              </a:rPr>
-              <a:t> </a:t>
-            </a:r>
-            <a:r>
-              <a:rPr lang="en-US" sz="1200" dirty="0" err="1">
-                <a:solidFill>
-                  <a:srgbClr val="FF0000"/>
-                </a:solidFill>
-                <a:latin typeface="Times New Roman" panose="02020603050405020304" pitchFamily="18" charset="0"/>
-                <a:cs typeface="Times New Roman" panose="02020603050405020304" pitchFamily="18" charset="0"/>
-              </a:rPr>
-              <a:t>kiểm</a:t>
-            </a:r>
-            <a:r>
-              <a:rPr lang="en-US" sz="1200" dirty="0">
-                <a:solidFill>
-                  <a:srgbClr val="FF0000"/>
-                </a:solidFill>
-                <a:latin typeface="Times New Roman" panose="02020603050405020304" pitchFamily="18" charset="0"/>
-                <a:cs typeface="Times New Roman" panose="02020603050405020304" pitchFamily="18" charset="0"/>
-              </a:rPr>
-              <a:t> </a:t>
-            </a:r>
-            <a:r>
-              <a:rPr lang="en-US" sz="1200" dirty="0" err="1">
-                <a:solidFill>
-                  <a:srgbClr val="FF0000"/>
-                </a:solidFill>
-                <a:latin typeface="Times New Roman" panose="02020603050405020304" pitchFamily="18" charset="0"/>
-                <a:cs typeface="Times New Roman" panose="02020603050405020304" pitchFamily="18" charset="0"/>
-              </a:rPr>
-              <a:t>soát</a:t>
-            </a:r>
-            <a:r>
-              <a:rPr lang="en-US" sz="1200" dirty="0">
-                <a:solidFill>
-                  <a:srgbClr val="FF0000"/>
-                </a:solidFill>
-                <a:latin typeface="Times New Roman" panose="02020603050405020304" pitchFamily="18" charset="0"/>
-                <a:cs typeface="Times New Roman" panose="02020603050405020304" pitchFamily="18" charset="0"/>
-              </a:rPr>
-              <a:t>)</a:t>
-            </a:r>
-          </a:p>
-        </p:txBody>
-      </p:sp>
-      <p:cxnSp>
-        <p:nvCxnSpPr>
-          <p:cNvPr id="12" name="Straight Arrow Connector 11"/>
-          <p:cNvCxnSpPr/>
-          <p:nvPr/>
-        </p:nvCxnSpPr>
-        <p:spPr>
-          <a:xfrm flipH="1" flipV="1">
-            <a:off x="3358662" y="4457701"/>
-            <a:ext cx="870438" cy="891450"/>
-          </a:xfrm>
-          <a:prstGeom prst="straightConnector1">
-            <a:avLst/>
-          </a:prstGeom>
-          <a:ln>
-            <a:tailEnd type="triangle"/>
-          </a:ln>
-        </p:spPr>
-        <p:style>
-          <a:lnRef idx="1">
-            <a:schemeClr val="accent2"/>
-          </a:lnRef>
-          <a:fillRef idx="0">
-            <a:schemeClr val="accent2"/>
-          </a:fillRef>
-          <a:effectRef idx="0">
-            <a:schemeClr val="accent2"/>
-          </a:effectRef>
-          <a:fontRef idx="minor">
-            <a:schemeClr val="tx1"/>
-          </a:fontRef>
-        </p:style>
-      </p:cxnSp>
-      <p:sp>
-        <p:nvSpPr>
-          <p:cNvPr id="13" name="TextBox 12"/>
-          <p:cNvSpPr txBox="1"/>
-          <p:nvPr/>
-        </p:nvSpPr>
-        <p:spPr>
-          <a:xfrm>
-            <a:off x="3068515" y="1283677"/>
-            <a:ext cx="1767254" cy="738664"/>
-          </a:xfrm>
-          <a:prstGeom prst="rect">
-            <a:avLst/>
-          </a:prstGeom>
-          <a:noFill/>
-        </p:spPr>
-        <p:txBody>
-          <a:bodyPr wrap="square" rtlCol="0">
-            <a:spAutoFit/>
-          </a:bodyPr>
-          <a:lstStyle/>
-          <a:p>
-            <a:r>
-              <a:rPr lang="en-US" sz="1400" dirty="0" err="1">
-                <a:solidFill>
-                  <a:srgbClr val="FF0000"/>
-                </a:solidFill>
-                <a:latin typeface="Times New Roman" panose="02020603050405020304" pitchFamily="18" charset="0"/>
-                <a:cs typeface="Times New Roman" panose="02020603050405020304" pitchFamily="18" charset="0"/>
-              </a:rPr>
-              <a:t>Lưu</a:t>
-            </a:r>
-            <a:r>
-              <a:rPr lang="en-US" sz="1400" dirty="0">
-                <a:solidFill>
-                  <a:srgbClr val="FF0000"/>
-                </a:solidFill>
-                <a:latin typeface="Times New Roman" panose="02020603050405020304" pitchFamily="18" charset="0"/>
-                <a:cs typeface="Times New Roman" panose="02020603050405020304" pitchFamily="18" charset="0"/>
-              </a:rPr>
-              <a:t> </a:t>
-            </a:r>
-            <a:r>
-              <a:rPr lang="en-US" sz="1400" dirty="0" err="1">
-                <a:solidFill>
-                  <a:srgbClr val="FF0000"/>
-                </a:solidFill>
-                <a:latin typeface="Times New Roman" panose="02020603050405020304" pitchFamily="18" charset="0"/>
-                <a:cs typeface="Times New Roman" panose="02020603050405020304" pitchFamily="18" charset="0"/>
-              </a:rPr>
-              <a:t>trạng</a:t>
-            </a:r>
-            <a:r>
-              <a:rPr lang="en-US" sz="1400" dirty="0">
-                <a:solidFill>
-                  <a:srgbClr val="FF0000"/>
-                </a:solidFill>
-                <a:latin typeface="Times New Roman" panose="02020603050405020304" pitchFamily="18" charset="0"/>
-                <a:cs typeface="Times New Roman" panose="02020603050405020304" pitchFamily="18" charset="0"/>
-              </a:rPr>
-              <a:t> </a:t>
-            </a:r>
-            <a:r>
-              <a:rPr lang="en-US" sz="1400" dirty="0" err="1">
-                <a:solidFill>
-                  <a:srgbClr val="FF0000"/>
-                </a:solidFill>
-                <a:latin typeface="Times New Roman" panose="02020603050405020304" pitchFamily="18" charset="0"/>
-                <a:cs typeface="Times New Roman" panose="02020603050405020304" pitchFamily="18" charset="0"/>
-              </a:rPr>
-              <a:t>thái</a:t>
-            </a:r>
-            <a:r>
-              <a:rPr lang="en-US" sz="1400" dirty="0">
-                <a:solidFill>
-                  <a:srgbClr val="FF0000"/>
-                </a:solidFill>
-                <a:latin typeface="Times New Roman" panose="02020603050405020304" pitchFamily="18" charset="0"/>
-                <a:cs typeface="Times New Roman" panose="02020603050405020304" pitchFamily="18" charset="0"/>
-              </a:rPr>
-              <a:t> </a:t>
-            </a:r>
-            <a:r>
-              <a:rPr lang="en-US" sz="1400" dirty="0" err="1">
-                <a:solidFill>
-                  <a:srgbClr val="FF0000"/>
-                </a:solidFill>
-                <a:latin typeface="Times New Roman" panose="02020603050405020304" pitchFamily="18" charset="0"/>
-                <a:cs typeface="Times New Roman" panose="02020603050405020304" pitchFamily="18" charset="0"/>
-              </a:rPr>
-              <a:t>để</a:t>
-            </a:r>
-            <a:r>
-              <a:rPr lang="en-US" sz="1400" dirty="0">
-                <a:solidFill>
-                  <a:srgbClr val="FF0000"/>
-                </a:solidFill>
-                <a:latin typeface="Times New Roman" panose="02020603050405020304" pitchFamily="18" charset="0"/>
-                <a:cs typeface="Times New Roman" panose="02020603050405020304" pitchFamily="18" charset="0"/>
-              </a:rPr>
-              <a:t> </a:t>
-            </a:r>
-            <a:r>
-              <a:rPr lang="en-US" sz="1400" dirty="0" err="1">
-                <a:solidFill>
-                  <a:srgbClr val="FF0000"/>
-                </a:solidFill>
-                <a:latin typeface="Times New Roman" panose="02020603050405020304" pitchFamily="18" charset="0"/>
-                <a:cs typeface="Times New Roman" panose="02020603050405020304" pitchFamily="18" charset="0"/>
-              </a:rPr>
-              <a:t>kiểm</a:t>
-            </a:r>
-            <a:r>
-              <a:rPr lang="en-US" sz="1400" dirty="0">
-                <a:solidFill>
-                  <a:srgbClr val="FF0000"/>
-                </a:solidFill>
-                <a:latin typeface="Times New Roman" panose="02020603050405020304" pitchFamily="18" charset="0"/>
-                <a:cs typeface="Times New Roman" panose="02020603050405020304" pitchFamily="18" charset="0"/>
-              </a:rPr>
-              <a:t> </a:t>
-            </a:r>
-            <a:r>
-              <a:rPr lang="en-US" sz="1400" dirty="0" err="1">
-                <a:solidFill>
-                  <a:srgbClr val="FF0000"/>
-                </a:solidFill>
-                <a:latin typeface="Times New Roman" panose="02020603050405020304" pitchFamily="18" charset="0"/>
-                <a:cs typeface="Times New Roman" panose="02020603050405020304" pitchFamily="18" charset="0"/>
-              </a:rPr>
-              <a:t>xem</a:t>
-            </a:r>
-            <a:r>
-              <a:rPr lang="en-US" sz="1400" dirty="0">
-                <a:solidFill>
-                  <a:srgbClr val="FF0000"/>
-                </a:solidFill>
-                <a:latin typeface="Times New Roman" panose="02020603050405020304" pitchFamily="18" charset="0"/>
-                <a:cs typeface="Times New Roman" panose="02020603050405020304" pitchFamily="18" charset="0"/>
-              </a:rPr>
-              <a:t> File </a:t>
-            </a:r>
-            <a:r>
-              <a:rPr lang="en-US" sz="1400" dirty="0" err="1">
-                <a:solidFill>
-                  <a:srgbClr val="FF0000"/>
-                </a:solidFill>
-                <a:latin typeface="Times New Roman" panose="02020603050405020304" pitchFamily="18" charset="0"/>
-                <a:cs typeface="Times New Roman" panose="02020603050405020304" pitchFamily="18" charset="0"/>
-              </a:rPr>
-              <a:t>nào</a:t>
-            </a:r>
-            <a:r>
-              <a:rPr lang="en-US" sz="1400" dirty="0">
-                <a:solidFill>
-                  <a:srgbClr val="FF0000"/>
-                </a:solidFill>
-                <a:latin typeface="Times New Roman" panose="02020603050405020304" pitchFamily="18" charset="0"/>
-                <a:cs typeface="Times New Roman" panose="02020603050405020304" pitchFamily="18" charset="0"/>
-              </a:rPr>
-              <a:t> </a:t>
-            </a:r>
-            <a:r>
-              <a:rPr lang="en-US" sz="1400" dirty="0" err="1">
-                <a:solidFill>
-                  <a:srgbClr val="FF0000"/>
-                </a:solidFill>
-                <a:latin typeface="Times New Roman" panose="02020603050405020304" pitchFamily="18" charset="0"/>
-                <a:cs typeface="Times New Roman" panose="02020603050405020304" pitchFamily="18" charset="0"/>
-              </a:rPr>
-              <a:t>mới</a:t>
-            </a:r>
-            <a:r>
-              <a:rPr lang="en-US" sz="1400" dirty="0">
-                <a:solidFill>
-                  <a:srgbClr val="FF0000"/>
-                </a:solidFill>
-                <a:latin typeface="Times New Roman" panose="02020603050405020304" pitchFamily="18" charset="0"/>
-                <a:cs typeface="Times New Roman" panose="02020603050405020304" pitchFamily="18" charset="0"/>
-              </a:rPr>
-              <a:t> them </a:t>
-            </a:r>
-            <a:r>
-              <a:rPr lang="en-US" sz="1400" dirty="0" err="1">
-                <a:solidFill>
-                  <a:srgbClr val="FF0000"/>
-                </a:solidFill>
-                <a:latin typeface="Times New Roman" panose="02020603050405020304" pitchFamily="18" charset="0"/>
-                <a:cs typeface="Times New Roman" panose="02020603050405020304" pitchFamily="18" charset="0"/>
-              </a:rPr>
-              <a:t>vào</a:t>
-            </a:r>
-            <a:r>
-              <a:rPr lang="en-US" sz="1400" dirty="0">
-                <a:solidFill>
-                  <a:srgbClr val="FF0000"/>
-                </a:solidFill>
-                <a:latin typeface="Times New Roman" panose="02020603050405020304" pitchFamily="18" charset="0"/>
-                <a:cs typeface="Times New Roman" panose="02020603050405020304" pitchFamily="18" charset="0"/>
-              </a:rPr>
-              <a:t>.</a:t>
-            </a:r>
-          </a:p>
-        </p:txBody>
-      </p:sp>
-      <p:sp>
-        <p:nvSpPr>
-          <p:cNvPr id="14" name="TextBox 13"/>
-          <p:cNvSpPr txBox="1"/>
-          <p:nvPr/>
-        </p:nvSpPr>
-        <p:spPr>
-          <a:xfrm>
-            <a:off x="774936" y="6173965"/>
-            <a:ext cx="3977306" cy="369332"/>
-          </a:xfrm>
-          <a:prstGeom prst="rect">
-            <a:avLst/>
-          </a:prstGeom>
-          <a:noFill/>
-        </p:spPr>
-        <p:txBody>
-          <a:bodyPr wrap="square" rtlCol="0">
-            <a:spAutoFit/>
-          </a:bodyPr>
-          <a:lstStyle/>
-          <a:p>
-            <a:r>
-              <a:rPr lang="en-US" dirty="0" err="1"/>
-              <a:t>Ghi</a:t>
-            </a:r>
-            <a:r>
-              <a:rPr lang="en-US" dirty="0"/>
-              <a:t> </a:t>
-            </a:r>
-            <a:r>
-              <a:rPr lang="en-US" dirty="0" err="1"/>
-              <a:t>nhận</a:t>
-            </a:r>
-            <a:r>
-              <a:rPr lang="en-US" dirty="0"/>
-              <a:t>( </a:t>
-            </a:r>
-            <a:r>
-              <a:rPr lang="en-US" dirty="0" err="1"/>
-              <a:t>Nhớ</a:t>
-            </a:r>
-            <a:r>
-              <a:rPr lang="en-US" dirty="0"/>
-              <a:t>) </a:t>
-            </a:r>
-            <a:r>
-              <a:rPr lang="en-US" dirty="0" err="1"/>
-              <a:t>sự</a:t>
-            </a:r>
-            <a:r>
-              <a:rPr lang="en-US" dirty="0"/>
-              <a:t> </a:t>
-            </a:r>
-            <a:r>
-              <a:rPr lang="en-US" dirty="0" err="1"/>
-              <a:t>thay</a:t>
-            </a:r>
-            <a:r>
-              <a:rPr lang="en-US" dirty="0"/>
-              <a:t> </a:t>
-            </a:r>
-            <a:r>
-              <a:rPr lang="en-US" dirty="0" err="1"/>
-              <a:t>đổi</a:t>
-            </a:r>
-            <a:r>
-              <a:rPr lang="en-US" dirty="0"/>
-              <a:t> </a:t>
-            </a:r>
-            <a:r>
-              <a:rPr lang="en-US" dirty="0" err="1"/>
-              <a:t>của</a:t>
-            </a:r>
-            <a:r>
-              <a:rPr lang="en-US" dirty="0"/>
-              <a:t> </a:t>
-            </a:r>
-            <a:r>
-              <a:rPr lang="en-US" dirty="0" err="1"/>
-              <a:t>các</a:t>
-            </a:r>
-            <a:r>
-              <a:rPr lang="en-US" dirty="0"/>
-              <a:t> File.</a:t>
-            </a:r>
-          </a:p>
-        </p:txBody>
-      </p:sp>
-      <p:sp>
-        <p:nvSpPr>
-          <p:cNvPr id="15" name="Down Arrow 14"/>
-          <p:cNvSpPr/>
-          <p:nvPr/>
-        </p:nvSpPr>
-        <p:spPr>
-          <a:xfrm>
-            <a:off x="2376347" y="4771982"/>
-            <a:ext cx="387242" cy="1409461"/>
-          </a:xfrm>
-          <a:prstGeom prst="downArrow">
-            <a:avLst/>
-          </a:prstGeom>
-        </p:spPr>
-        <p:style>
-          <a:lnRef idx="2">
-            <a:schemeClr val="accent1">
-              <a:shade val="50000"/>
-            </a:schemeClr>
-          </a:lnRef>
-          <a:fillRef idx="1">
-            <a:schemeClr val="accent1"/>
-          </a:fillRef>
-          <a:effectRef idx="0">
-            <a:schemeClr val="accent1"/>
-          </a:effectRef>
-          <a:fontRef idx="minor">
-            <a:schemeClr val="lt1"/>
-          </a:fontRef>
-        </p:style>
-        <p:txBody>
-          <a:bodyPr rtlCol="0" anchor="ctr"/>
-          <a:lstStyle/>
-          <a:p>
-            <a:pPr algn="ctr"/>
-            <a:endParaRPr lang="en-US"/>
-          </a:p>
-        </p:txBody>
-      </p:sp>
-      <p:cxnSp>
-        <p:nvCxnSpPr>
-          <p:cNvPr id="18" name="Straight Arrow Connector 17"/>
-          <p:cNvCxnSpPr/>
-          <p:nvPr/>
-        </p:nvCxnSpPr>
-        <p:spPr>
-          <a:xfrm>
-            <a:off x="5372100" y="4771982"/>
-            <a:ext cx="894844" cy="1401983"/>
-          </a:xfrm>
-          <a:prstGeom prst="straightConnector1">
-            <a:avLst/>
-          </a:prstGeom>
-          <a:ln>
-            <a:tailEnd type="triangle"/>
-          </a:ln>
-        </p:spPr>
-        <p:style>
-          <a:lnRef idx="1">
-            <a:schemeClr val="accent6"/>
-          </a:lnRef>
-          <a:fillRef idx="0">
-            <a:schemeClr val="accent6"/>
-          </a:fillRef>
-          <a:effectRef idx="0">
-            <a:schemeClr val="accent6"/>
-          </a:effectRef>
-          <a:fontRef idx="minor">
-            <a:schemeClr val="tx1"/>
-          </a:fontRef>
-        </p:style>
-      </p:cxnSp>
-      <p:sp>
-        <p:nvSpPr>
-          <p:cNvPr id="19" name="TextBox 18"/>
-          <p:cNvSpPr txBox="1"/>
-          <p:nvPr/>
-        </p:nvSpPr>
-        <p:spPr>
-          <a:xfrm>
-            <a:off x="5055578" y="6202557"/>
-            <a:ext cx="6840414" cy="369332"/>
-          </a:xfrm>
-          <a:prstGeom prst="rect">
-            <a:avLst/>
-          </a:prstGeom>
-          <a:noFill/>
-        </p:spPr>
-        <p:txBody>
-          <a:bodyPr wrap="square" rtlCol="0">
-            <a:spAutoFit/>
-          </a:bodyPr>
-          <a:lstStyle/>
-          <a:p>
-            <a:r>
-              <a:rPr lang="en-US" dirty="0" err="1"/>
-              <a:t>Đẩy</a:t>
-            </a:r>
-            <a:r>
-              <a:rPr lang="en-US" dirty="0"/>
-              <a:t> Code( </a:t>
-            </a:r>
-            <a:r>
-              <a:rPr lang="en-US" dirty="0" err="1"/>
-              <a:t>tạo</a:t>
-            </a:r>
-            <a:r>
-              <a:rPr lang="en-US" dirty="0"/>
-              <a:t> </a:t>
-            </a:r>
-            <a:r>
-              <a:rPr lang="en-US" dirty="0" err="1"/>
-              <a:t>phiên</a:t>
-            </a:r>
-            <a:r>
-              <a:rPr lang="en-US" dirty="0"/>
-              <a:t> </a:t>
-            </a:r>
-            <a:r>
-              <a:rPr lang="en-US" dirty="0" err="1"/>
-              <a:t>bản</a:t>
-            </a:r>
-            <a:r>
-              <a:rPr lang="en-US" dirty="0"/>
-              <a:t> Backup) </a:t>
-            </a:r>
-            <a:r>
-              <a:rPr lang="en-US" dirty="0" err="1"/>
-              <a:t>vào</a:t>
-            </a:r>
-            <a:r>
-              <a:rPr lang="en-US" dirty="0"/>
-              <a:t> .</a:t>
-            </a:r>
-            <a:r>
-              <a:rPr lang="en-US" dirty="0" err="1"/>
-              <a:t>git</a:t>
-            </a:r>
-            <a:r>
-              <a:rPr lang="en-US" dirty="0"/>
-              <a:t> </a:t>
-            </a:r>
-            <a:r>
-              <a:rPr lang="en-US" dirty="0" err="1"/>
-              <a:t>tại</a:t>
-            </a:r>
-            <a:r>
-              <a:rPr lang="en-US" dirty="0"/>
-              <a:t> Local </a:t>
-            </a:r>
-            <a:r>
-              <a:rPr lang="en-US" dirty="0" err="1"/>
-              <a:t>để</a:t>
-            </a:r>
-            <a:r>
-              <a:rPr lang="en-US" dirty="0"/>
-              <a:t> </a:t>
-            </a:r>
-            <a:r>
-              <a:rPr lang="en-US" dirty="0" err="1"/>
-              <a:t>chứa</a:t>
-            </a:r>
-            <a:endParaRPr lang="en-US" dirty="0"/>
-          </a:p>
-        </p:txBody>
-      </p:sp>
-      <p:pic>
-        <p:nvPicPr>
-          <p:cNvPr id="22" name="Picture 21"/>
-          <p:cNvPicPr>
-            <a:picLocks noChangeAspect="1"/>
-          </p:cNvPicPr>
-          <p:nvPr/>
-        </p:nvPicPr>
-        <p:blipFill>
-          <a:blip r:embed="rId4"/>
-          <a:stretch>
-            <a:fillRect/>
-          </a:stretch>
-        </p:blipFill>
-        <p:spPr>
-          <a:xfrm>
-            <a:off x="5055578" y="1117659"/>
-            <a:ext cx="1620136" cy="885949"/>
-          </a:xfrm>
-          <a:prstGeom prst="rect">
-            <a:avLst/>
-          </a:prstGeom>
-        </p:spPr>
-      </p:pic>
-      <p:sp>
-        <p:nvSpPr>
-          <p:cNvPr id="23" name="TextBox 22"/>
-          <p:cNvSpPr txBox="1"/>
-          <p:nvPr/>
-        </p:nvSpPr>
-        <p:spPr>
-          <a:xfrm>
-            <a:off x="5111742" y="2985769"/>
-            <a:ext cx="1415560" cy="646331"/>
-          </a:xfrm>
-          <a:prstGeom prst="rect">
-            <a:avLst/>
-          </a:prstGeom>
-          <a:noFill/>
-        </p:spPr>
-        <p:txBody>
-          <a:bodyPr wrap="square" rtlCol="0">
-            <a:spAutoFit/>
-          </a:bodyPr>
-          <a:lstStyle/>
-          <a:p>
-            <a:r>
-              <a:rPr lang="en-US" dirty="0" err="1"/>
-              <a:t>Nơi</a:t>
-            </a:r>
-            <a:r>
-              <a:rPr lang="en-US" dirty="0"/>
-              <a:t> </a:t>
-            </a:r>
-            <a:r>
-              <a:rPr lang="en-US" dirty="0" err="1"/>
-              <a:t>lưu</a:t>
-            </a:r>
-            <a:r>
-              <a:rPr lang="en-US" dirty="0"/>
-              <a:t> Code </a:t>
-            </a:r>
-            <a:r>
-              <a:rPr lang="en-US" dirty="0" err="1"/>
-              <a:t>tại</a:t>
-            </a:r>
-            <a:r>
-              <a:rPr lang="en-US" dirty="0"/>
-              <a:t> Local.</a:t>
-            </a:r>
-          </a:p>
-        </p:txBody>
-      </p:sp>
-    </p:spTree>
-    <p:extLst>
-      <p:ext uri="{BB962C8B-B14F-4D97-AF65-F5344CB8AC3E}">
-        <p14:creationId xmlns:p14="http://schemas.microsoft.com/office/powerpoint/2010/main" val="347252250"/>
-      </p:ext>
-    </p:extLst>
-  </p:cSld>
-  <p:clrMapOvr>
-    <a:masterClrMapping/>
-  </p:clrMapOvr>
-</p:sld>
-</file>
-
-<file path=ppt/slides/slide24.xml><?xml version="1.0" encoding="utf-8"?>
-<p:sld xmlns:a="http://schemas.openxmlformats.org/drawingml/2006/main" xmlns:r="http://schemas.openxmlformats.org/officeDocument/2006/relationships" xmlns:p="http://schemas.openxmlformats.org/presentationml/2006/main">
-  <p:cSld>
-    <p:spTree>
-      <p:nvGrpSpPr>
-        <p:cNvPr id="1" name=""/>
-        <p:cNvGrpSpPr/>
-        <p:nvPr/>
-      </p:nvGrpSpPr>
-      <p:grpSpPr>
-        <a:xfrm>
-          <a:off x="0" y="0"/>
-          <a:ext cx="0" cy="0"/>
-          <a:chOff x="0" y="0"/>
-          <a:chExt cx="0" cy="0"/>
-        </a:xfrm>
-      </p:grpSpPr>
-      <p:sp>
-        <p:nvSpPr>
-          <p:cNvPr id="2" name="TextBox 1"/>
-          <p:cNvSpPr txBox="1"/>
-          <p:nvPr/>
-        </p:nvSpPr>
-        <p:spPr>
-          <a:xfrm>
-            <a:off x="861646" y="800100"/>
-            <a:ext cx="10937631" cy="4695092"/>
-          </a:xfrm>
-          <a:prstGeom prst="rect">
-            <a:avLst/>
-          </a:prstGeom>
-          <a:noFill/>
-        </p:spPr>
-        <p:txBody>
-          <a:bodyPr wrap="square" rtlCol="0">
-            <a:spAutoFit/>
-          </a:bodyPr>
-          <a:lstStyle/>
-          <a:p>
-            <a:endParaRPr lang="en-US" dirty="0"/>
-          </a:p>
-        </p:txBody>
-      </p:sp>
-      <p:pic>
-        <p:nvPicPr>
-          <p:cNvPr id="3" name="Picture 2"/>
-          <p:cNvPicPr>
-            <a:picLocks noChangeAspect="1"/>
-          </p:cNvPicPr>
-          <p:nvPr/>
-        </p:nvPicPr>
-        <p:blipFill>
-          <a:blip r:embed="rId2"/>
-          <a:stretch>
-            <a:fillRect/>
-          </a:stretch>
-        </p:blipFill>
-        <p:spPr>
-          <a:xfrm>
-            <a:off x="700400" y="3367454"/>
-            <a:ext cx="5534797" cy="2954215"/>
-          </a:xfrm>
-          <a:prstGeom prst="rect">
-            <a:avLst/>
-          </a:prstGeom>
-        </p:spPr>
-      </p:pic>
-      <p:pic>
-        <p:nvPicPr>
-          <p:cNvPr id="4" name="Picture 3"/>
-          <p:cNvPicPr>
-            <a:picLocks noChangeAspect="1"/>
-          </p:cNvPicPr>
-          <p:nvPr/>
-        </p:nvPicPr>
-        <p:blipFill>
-          <a:blip r:embed="rId3"/>
-          <a:stretch>
-            <a:fillRect/>
-          </a:stretch>
-        </p:blipFill>
-        <p:spPr>
-          <a:xfrm>
-            <a:off x="605137" y="690555"/>
-            <a:ext cx="5725324" cy="2676899"/>
-          </a:xfrm>
-          <a:prstGeom prst="rect">
-            <a:avLst/>
-          </a:prstGeom>
-        </p:spPr>
-      </p:pic>
-      <p:sp>
-        <p:nvSpPr>
-          <p:cNvPr id="5" name="TextBox 4"/>
-          <p:cNvSpPr txBox="1"/>
-          <p:nvPr/>
-        </p:nvSpPr>
-        <p:spPr>
-          <a:xfrm>
-            <a:off x="6594231" y="800100"/>
-            <a:ext cx="5205046" cy="646331"/>
-          </a:xfrm>
-          <a:prstGeom prst="rect">
-            <a:avLst/>
-          </a:prstGeom>
-          <a:noFill/>
-        </p:spPr>
-        <p:txBody>
-          <a:bodyPr wrap="square" rtlCol="0">
-            <a:spAutoFit/>
-          </a:bodyPr>
-          <a:lstStyle/>
-          <a:p>
-            <a:r>
-              <a:rPr lang="en-US" dirty="0" err="1"/>
-              <a:t>Hiển</a:t>
-            </a:r>
-            <a:r>
-              <a:rPr lang="en-US" dirty="0"/>
-              <a:t> </a:t>
-            </a:r>
-            <a:r>
-              <a:rPr lang="en-US" dirty="0" err="1"/>
-              <a:t>thị</a:t>
-            </a:r>
-            <a:r>
-              <a:rPr lang="en-US" dirty="0"/>
-              <a:t> </a:t>
-            </a:r>
-            <a:r>
-              <a:rPr lang="en-US" dirty="0" err="1"/>
-              <a:t>trạng</a:t>
-            </a:r>
-            <a:r>
-              <a:rPr lang="en-US" dirty="0"/>
-              <a:t> </a:t>
-            </a:r>
-            <a:r>
-              <a:rPr lang="en-US" dirty="0" err="1"/>
-              <a:t>thái</a:t>
-            </a:r>
-            <a:r>
-              <a:rPr lang="en-US" dirty="0"/>
-              <a:t> </a:t>
-            </a:r>
-            <a:r>
-              <a:rPr lang="en-US" dirty="0" err="1"/>
-              <a:t>các</a:t>
-            </a:r>
-            <a:r>
-              <a:rPr lang="en-US" dirty="0"/>
-              <a:t> File </a:t>
-            </a:r>
-            <a:r>
-              <a:rPr lang="en-US" dirty="0" err="1"/>
-              <a:t>trên</a:t>
-            </a:r>
-            <a:r>
-              <a:rPr lang="en-US" dirty="0"/>
-              <a:t> </a:t>
-            </a:r>
-            <a:r>
-              <a:rPr lang="en-US" dirty="0" err="1"/>
-              <a:t>máy</a:t>
-            </a:r>
-            <a:r>
-              <a:rPr lang="en-US" dirty="0"/>
-              <a:t> </a:t>
-            </a:r>
-            <a:r>
-              <a:rPr lang="en-US" dirty="0" err="1"/>
-              <a:t>tính</a:t>
-            </a:r>
-            <a:r>
-              <a:rPr lang="en-US" dirty="0"/>
-              <a:t>, </a:t>
-            </a:r>
-            <a:r>
-              <a:rPr lang="en-US" dirty="0" err="1"/>
-              <a:t>hiển</a:t>
-            </a:r>
-            <a:r>
-              <a:rPr lang="en-US" dirty="0"/>
-              <a:t> </a:t>
-            </a:r>
-            <a:r>
-              <a:rPr lang="en-US" dirty="0" err="1"/>
-              <a:t>thị</a:t>
-            </a:r>
-            <a:r>
-              <a:rPr lang="en-US" dirty="0"/>
-              <a:t> </a:t>
-            </a:r>
-            <a:r>
-              <a:rPr lang="en-US" dirty="0" err="1"/>
-              <a:t>trạng</a:t>
-            </a:r>
-            <a:r>
-              <a:rPr lang="en-US" dirty="0"/>
-              <a:t> </a:t>
-            </a:r>
-            <a:r>
-              <a:rPr lang="en-US" dirty="0" err="1"/>
-              <a:t>thái</a:t>
-            </a:r>
-            <a:r>
-              <a:rPr lang="en-US" dirty="0"/>
-              <a:t> them </a:t>
-            </a:r>
-            <a:r>
-              <a:rPr lang="en-US" dirty="0" err="1"/>
-              <a:t>sửa</a:t>
-            </a:r>
-            <a:r>
-              <a:rPr lang="en-US" dirty="0"/>
-              <a:t> </a:t>
-            </a:r>
-            <a:r>
-              <a:rPr lang="en-US" dirty="0" err="1"/>
-              <a:t>xóa</a:t>
-            </a:r>
-            <a:r>
-              <a:rPr lang="en-US" dirty="0"/>
-              <a:t> </a:t>
-            </a:r>
-            <a:r>
-              <a:rPr lang="en-US" dirty="0" err="1"/>
-              <a:t>của</a:t>
-            </a:r>
-            <a:r>
-              <a:rPr lang="en-US" dirty="0"/>
-              <a:t> File.</a:t>
-            </a:r>
-          </a:p>
-        </p:txBody>
-      </p:sp>
-      <p:sp>
-        <p:nvSpPr>
-          <p:cNvPr id="6" name="TextBox 5"/>
-          <p:cNvSpPr txBox="1"/>
-          <p:nvPr/>
-        </p:nvSpPr>
-        <p:spPr>
-          <a:xfrm>
-            <a:off x="6708531" y="3367454"/>
-            <a:ext cx="5090746" cy="369332"/>
-          </a:xfrm>
-          <a:prstGeom prst="rect">
-            <a:avLst/>
-          </a:prstGeom>
-          <a:noFill/>
-        </p:spPr>
-        <p:txBody>
-          <a:bodyPr wrap="square" rtlCol="0">
-            <a:spAutoFit/>
-          </a:bodyPr>
-          <a:lstStyle/>
-          <a:p>
-            <a:r>
-              <a:rPr lang="en-US" dirty="0" err="1"/>
-              <a:t>Lưu</a:t>
-            </a:r>
-            <a:r>
-              <a:rPr lang="en-US" dirty="0"/>
-              <a:t> </a:t>
-            </a:r>
-            <a:r>
-              <a:rPr lang="en-US" dirty="0" err="1"/>
-              <a:t>lại</a:t>
-            </a:r>
-            <a:r>
-              <a:rPr lang="en-US" dirty="0"/>
-              <a:t> </a:t>
-            </a:r>
-            <a:r>
-              <a:rPr lang="en-US" dirty="0" err="1"/>
-              <a:t>các</a:t>
-            </a:r>
-            <a:r>
-              <a:rPr lang="en-US" dirty="0"/>
-              <a:t> File </a:t>
-            </a:r>
-            <a:r>
-              <a:rPr lang="en-US" dirty="0" err="1"/>
-              <a:t>này</a:t>
-            </a:r>
-            <a:r>
-              <a:rPr lang="en-US" dirty="0"/>
-              <a:t>.</a:t>
-            </a:r>
-          </a:p>
-        </p:txBody>
-      </p:sp>
-    </p:spTree>
-    <p:extLst>
-      <p:ext uri="{BB962C8B-B14F-4D97-AF65-F5344CB8AC3E}">
-        <p14:creationId xmlns:p14="http://schemas.microsoft.com/office/powerpoint/2010/main" val="2545016784"/>
-      </p:ext>
-    </p:extLst>
-  </p:cSld>
-  <p:clrMapOvr>
-    <a:masterClrMapping/>
-  </p:clrMapOvr>
-</p:sld>
-</file>
-
 <file path=ppt/slides/slide25.xml><?xml version="1.0" encoding="utf-8"?>
 <p:sld xmlns:a="http://schemas.openxmlformats.org/drawingml/2006/main" xmlns:r="http://schemas.openxmlformats.org/officeDocument/2006/relationships" xmlns:p="http://schemas.openxmlformats.org/presentationml/2006/main">
   <p:cSld>
@@ -7508,6 +6449,32 @@
           <a:chExt cx="0" cy="0"/>
         </a:xfrm>
       </p:grpSpPr>
+      <p:sp>
+        <p:nvSpPr>
+          <p:cNvPr id="2" name="TextBox 1"/>
+          <p:cNvSpPr txBox="1"/>
+          <p:nvPr/>
+        </p:nvSpPr>
+        <p:spPr>
+          <a:xfrm>
+            <a:off x="254976" y="153504"/>
+            <a:ext cx="11702562" cy="6418385"/>
+          </a:xfrm>
+          <a:prstGeom prst="rect">
+            <a:avLst/>
+          </a:prstGeom>
+          <a:noFill/>
+        </p:spPr>
+        <p:txBody>
+          <a:bodyPr wrap="square" rtlCol="0">
+            <a:spAutoFit/>
+          </a:bodyPr>
+          <a:lstStyle/>
+          <a:p>
+            <a:endParaRPr lang="en-US" dirty="0"/>
+          </a:p>
+        </p:txBody>
+      </p:sp>
       <p:pic>
         <p:nvPicPr>
           <p:cNvPr id="3" name="Picture 2"/>
@@ -7524,155 +6491,17 @@
         </p:blipFill>
         <p:spPr>
           <a:xfrm>
-            <a:off x="431528" y="417841"/>
-            <a:ext cx="5649113" cy="2276793"/>
+            <a:off x="861645" y="562709"/>
+            <a:ext cx="11095893" cy="5495192"/>
           </a:xfrm>
           <a:prstGeom prst="rect">
             <a:avLst/>
           </a:prstGeom>
         </p:spPr>
       </p:pic>
-      <p:sp>
-        <p:nvSpPr>
-          <p:cNvPr id="4" name="TextBox 3"/>
-          <p:cNvSpPr txBox="1"/>
-          <p:nvPr/>
-        </p:nvSpPr>
-        <p:spPr>
-          <a:xfrm>
-            <a:off x="6585438" y="483577"/>
-            <a:ext cx="5046785" cy="369332"/>
-          </a:xfrm>
-          <a:prstGeom prst="rect">
-            <a:avLst/>
-          </a:prstGeom>
-          <a:noFill/>
-        </p:spPr>
-        <p:txBody>
-          <a:bodyPr wrap="square" rtlCol="0">
-            <a:spAutoFit/>
-          </a:bodyPr>
-          <a:lstStyle/>
-          <a:p>
-            <a:r>
-              <a:rPr lang="en-US" dirty="0" err="1"/>
-              <a:t>Giống</a:t>
-            </a:r>
-            <a:r>
-              <a:rPr lang="en-US" dirty="0"/>
-              <a:t> </a:t>
-            </a:r>
-            <a:r>
-              <a:rPr lang="en-US" dirty="0" err="1"/>
-              <a:t>việc</a:t>
-            </a:r>
-            <a:r>
-              <a:rPr lang="en-US" dirty="0"/>
-              <a:t> Comment </a:t>
-            </a:r>
-            <a:r>
-              <a:rPr lang="en-US" dirty="0" err="1"/>
-              <a:t>nội</a:t>
-            </a:r>
-            <a:r>
-              <a:rPr lang="en-US" dirty="0"/>
-              <a:t> dung.</a:t>
-            </a:r>
-          </a:p>
-        </p:txBody>
-      </p:sp>
-      <p:sp>
-        <p:nvSpPr>
-          <p:cNvPr id="5" name="TextBox 4"/>
-          <p:cNvSpPr txBox="1"/>
-          <p:nvPr/>
-        </p:nvSpPr>
-        <p:spPr>
-          <a:xfrm>
-            <a:off x="6585438" y="1081454"/>
-            <a:ext cx="4510454" cy="369332"/>
-          </a:xfrm>
-          <a:prstGeom prst="rect">
-            <a:avLst/>
-          </a:prstGeom>
-          <a:noFill/>
-        </p:spPr>
-        <p:txBody>
-          <a:bodyPr wrap="square" rtlCol="0">
-            <a:spAutoFit/>
-          </a:bodyPr>
-          <a:lstStyle/>
-          <a:p>
-            <a:r>
-              <a:rPr lang="en-US" dirty="0" err="1"/>
-              <a:t>Chú</a:t>
-            </a:r>
-            <a:r>
-              <a:rPr lang="en-US" dirty="0"/>
-              <a:t> </a:t>
-            </a:r>
-            <a:r>
-              <a:rPr lang="en-US" dirty="0" err="1"/>
-              <a:t>thích</a:t>
-            </a:r>
-            <a:r>
-              <a:rPr lang="en-US" dirty="0"/>
-              <a:t> </a:t>
-            </a:r>
-            <a:r>
-              <a:rPr lang="en-US" dirty="0" err="1"/>
-              <a:t>cho</a:t>
-            </a:r>
-            <a:r>
-              <a:rPr lang="en-US" dirty="0"/>
-              <a:t> </a:t>
-            </a:r>
-            <a:r>
-              <a:rPr lang="en-US" dirty="0" err="1"/>
-              <a:t>nội</a:t>
-            </a:r>
-            <a:r>
-              <a:rPr lang="en-US" dirty="0"/>
-              <a:t> dung </a:t>
-            </a:r>
-            <a:r>
-              <a:rPr lang="en-US" dirty="0" err="1"/>
-              <a:t>công</a:t>
-            </a:r>
-            <a:r>
-              <a:rPr lang="en-US" dirty="0"/>
-              <a:t> </a:t>
-            </a:r>
-            <a:r>
-              <a:rPr lang="en-US" dirty="0" err="1"/>
-              <a:t>việc</a:t>
-            </a:r>
-            <a:r>
-              <a:rPr lang="en-US" dirty="0"/>
-              <a:t> </a:t>
-            </a:r>
-            <a:r>
-              <a:rPr lang="en-US" dirty="0" err="1"/>
-              <a:t>đang</a:t>
-            </a:r>
-            <a:r>
-              <a:rPr lang="en-US" dirty="0"/>
-              <a:t> </a:t>
-            </a:r>
-            <a:r>
-              <a:rPr lang="en-US" dirty="0" err="1"/>
-              <a:t>làm</a:t>
-            </a:r>
-            <a:r>
-              <a:rPr lang="en-US" dirty="0"/>
-              <a:t>.</a:t>
-            </a:r>
-          </a:p>
-        </p:txBody>
-      </p:sp>
       <p:pic>
         <p:nvPicPr>
-          <p:cNvPr id="6" name="Picture 5"/>
+          <p:cNvPr id="5" name="Picture 4"/>
           <p:cNvPicPr>
             <a:picLocks noChangeAspect="1"/>
           </p:cNvPicPr>
@@ -7686,24 +6515,57 @@
         </p:blipFill>
         <p:spPr>
           <a:xfrm>
-            <a:off x="431528" y="3100980"/>
-            <a:ext cx="5506218" cy="2010056"/>
+            <a:off x="193431" y="5034782"/>
+            <a:ext cx="1629002" cy="628738"/>
           </a:xfrm>
           <a:prstGeom prst="rect">
             <a:avLst/>
           </a:prstGeom>
         </p:spPr>
       </p:pic>
-      <p:sp>
-        <p:nvSpPr>
-          <p:cNvPr id="7" name="TextBox 6"/>
+      <p:cxnSp>
+        <p:nvCxnSpPr>
+          <p:cNvPr id="7" name="Straight Arrow Connector 6"/>
+          <p:cNvCxnSpPr/>
+          <p:nvPr/>
+        </p:nvCxnSpPr>
+        <p:spPr>
+          <a:xfrm flipV="1">
+            <a:off x="1069477" y="4457701"/>
+            <a:ext cx="1172561" cy="628562"/>
+          </a:xfrm>
+          <a:prstGeom prst="straightConnector1">
+            <a:avLst/>
+          </a:prstGeom>
+          <a:ln>
+            <a:tailEnd type="triangle"/>
+          </a:ln>
+        </p:spPr>
+        <p:style>
+          <a:lnRef idx="1">
+            <a:schemeClr val="accent1"/>
+          </a:lnRef>
+          <a:fillRef idx="0">
+            <a:schemeClr val="accent1"/>
+          </a:fillRef>
+          <a:effectRef idx="0">
+            <a:schemeClr val="accent1"/>
+          </a:effectRef>
+          <a:fontRef idx="minor">
+            <a:schemeClr val="tx1"/>
+          </a:fontRef>
+        </p:style>
+      </p:cxnSp>
+      <p:sp>
+        <p:nvSpPr>
+          <p:cNvPr id="9" name="TextBox 8"/>
           <p:cNvSpPr txBox="1"/>
           <p:nvPr/>
         </p:nvSpPr>
         <p:spPr>
           <a:xfrm>
-            <a:off x="6585438" y="3077308"/>
-            <a:ext cx="5125916" cy="369332"/>
+            <a:off x="254976" y="4340971"/>
+            <a:ext cx="1629002" cy="577081"/>
           </a:xfrm>
           <a:prstGeom prst="rect">
             <a:avLst/>
@@ -7717,28 +6579,993 @@
           <a:lstStyle/>
           <a:p>
             <a:r>
+              <a:rPr lang="en-US" sz="1050" dirty="0" err="1">
+                <a:latin typeface="Times New Roman" panose="02020603050405020304" pitchFamily="18" charset="0"/>
+                <a:cs typeface="Times New Roman" panose="02020603050405020304" pitchFamily="18" charset="0"/>
+              </a:rPr>
+              <a:t>Hiện</a:t>
+            </a:r>
+            <a:r>
+              <a:rPr lang="en-US" sz="1050" dirty="0">
+                <a:latin typeface="Times New Roman" panose="02020603050405020304" pitchFamily="18" charset="0"/>
+                <a:cs typeface="Times New Roman" panose="02020603050405020304" pitchFamily="18" charset="0"/>
+              </a:rPr>
+              <a:t> </a:t>
+            </a:r>
+            <a:r>
+              <a:rPr lang="en-US" sz="1050" dirty="0" err="1">
+                <a:latin typeface="Times New Roman" panose="02020603050405020304" pitchFamily="18" charset="0"/>
+                <a:cs typeface="Times New Roman" panose="02020603050405020304" pitchFamily="18" charset="0"/>
+              </a:rPr>
+              <a:t>màu</a:t>
+            </a:r>
+            <a:r>
+              <a:rPr lang="en-US" sz="1050" dirty="0">
+                <a:latin typeface="Times New Roman" panose="02020603050405020304" pitchFamily="18" charset="0"/>
+                <a:cs typeface="Times New Roman" panose="02020603050405020304" pitchFamily="18" charset="0"/>
+              </a:rPr>
+              <a:t> </a:t>
+            </a:r>
+            <a:r>
+              <a:rPr lang="en-US" sz="1050" dirty="0" err="1">
+                <a:latin typeface="Times New Roman" panose="02020603050405020304" pitchFamily="18" charset="0"/>
+                <a:cs typeface="Times New Roman" panose="02020603050405020304" pitchFamily="18" charset="0"/>
+              </a:rPr>
+              <a:t>đỏ</a:t>
+            </a:r>
+            <a:r>
+              <a:rPr lang="en-US" sz="1050" dirty="0">
+                <a:latin typeface="Times New Roman" panose="02020603050405020304" pitchFamily="18" charset="0"/>
+                <a:cs typeface="Times New Roman" panose="02020603050405020304" pitchFamily="18" charset="0"/>
+              </a:rPr>
+              <a:t> </a:t>
+            </a:r>
+            <a:r>
+              <a:rPr lang="en-US" sz="1050" dirty="0" err="1">
+                <a:latin typeface="Times New Roman" panose="02020603050405020304" pitchFamily="18" charset="0"/>
+                <a:cs typeface="Times New Roman" panose="02020603050405020304" pitchFamily="18" charset="0"/>
+              </a:rPr>
+              <a:t>nghĩa</a:t>
+            </a:r>
+            <a:r>
+              <a:rPr lang="en-US" sz="1050" dirty="0">
+                <a:latin typeface="Times New Roman" panose="02020603050405020304" pitchFamily="18" charset="0"/>
+                <a:cs typeface="Times New Roman" panose="02020603050405020304" pitchFamily="18" charset="0"/>
+              </a:rPr>
+              <a:t> </a:t>
+            </a:r>
+            <a:r>
+              <a:rPr lang="en-US" sz="1050" dirty="0" err="1">
+                <a:latin typeface="Times New Roman" panose="02020603050405020304" pitchFamily="18" charset="0"/>
+                <a:cs typeface="Times New Roman" panose="02020603050405020304" pitchFamily="18" charset="0"/>
+              </a:rPr>
+              <a:t>là</a:t>
+            </a:r>
+            <a:r>
+              <a:rPr lang="en-US" sz="1050" dirty="0">
+                <a:latin typeface="Times New Roman" panose="02020603050405020304" pitchFamily="18" charset="0"/>
+                <a:cs typeface="Times New Roman" panose="02020603050405020304" pitchFamily="18" charset="0"/>
+              </a:rPr>
+              <a:t> File </a:t>
+            </a:r>
+            <a:r>
+              <a:rPr lang="en-US" sz="1050" dirty="0" err="1">
+                <a:latin typeface="Times New Roman" panose="02020603050405020304" pitchFamily="18" charset="0"/>
+                <a:cs typeface="Times New Roman" panose="02020603050405020304" pitchFamily="18" charset="0"/>
+              </a:rPr>
+              <a:t>mới</a:t>
+            </a:r>
+            <a:r>
+              <a:rPr lang="en-US" sz="1050" dirty="0">
+                <a:latin typeface="Times New Roman" panose="02020603050405020304" pitchFamily="18" charset="0"/>
+                <a:cs typeface="Times New Roman" panose="02020603050405020304" pitchFamily="18" charset="0"/>
+              </a:rPr>
+              <a:t> them </a:t>
+            </a:r>
+            <a:r>
+              <a:rPr lang="en-US" sz="1050" dirty="0" err="1">
+                <a:latin typeface="Times New Roman" panose="02020603050405020304" pitchFamily="18" charset="0"/>
+                <a:cs typeface="Times New Roman" panose="02020603050405020304" pitchFamily="18" charset="0"/>
+              </a:rPr>
+              <a:t>chưa</a:t>
+            </a:r>
+            <a:r>
+              <a:rPr lang="en-US" sz="1050" dirty="0">
+                <a:latin typeface="Times New Roman" panose="02020603050405020304" pitchFamily="18" charset="0"/>
+                <a:cs typeface="Times New Roman" panose="02020603050405020304" pitchFamily="18" charset="0"/>
+              </a:rPr>
+              <a:t> </a:t>
+            </a:r>
+            <a:r>
+              <a:rPr lang="en-US" sz="1050" dirty="0" err="1">
+                <a:latin typeface="Times New Roman" panose="02020603050405020304" pitchFamily="18" charset="0"/>
+                <a:cs typeface="Times New Roman" panose="02020603050405020304" pitchFamily="18" charset="0"/>
+              </a:rPr>
+              <a:t>được</a:t>
+            </a:r>
+            <a:r>
+              <a:rPr lang="en-US" sz="1050" dirty="0">
+                <a:latin typeface="Times New Roman" panose="02020603050405020304" pitchFamily="18" charset="0"/>
+                <a:cs typeface="Times New Roman" panose="02020603050405020304" pitchFamily="18" charset="0"/>
+              </a:rPr>
+              <a:t> </a:t>
+            </a:r>
+            <a:r>
+              <a:rPr lang="en-US" sz="1050" dirty="0" err="1">
+                <a:latin typeface="Times New Roman" panose="02020603050405020304" pitchFamily="18" charset="0"/>
+                <a:cs typeface="Times New Roman" panose="02020603050405020304" pitchFamily="18" charset="0"/>
+              </a:rPr>
+              <a:t>kiểm</a:t>
+            </a:r>
+            <a:r>
+              <a:rPr lang="en-US" sz="1050" dirty="0">
+                <a:latin typeface="Times New Roman" panose="02020603050405020304" pitchFamily="18" charset="0"/>
+                <a:cs typeface="Times New Roman" panose="02020603050405020304" pitchFamily="18" charset="0"/>
+              </a:rPr>
+              <a:t> </a:t>
+            </a:r>
+            <a:r>
+              <a:rPr lang="en-US" sz="1050" dirty="0" err="1">
+                <a:latin typeface="Times New Roman" panose="02020603050405020304" pitchFamily="18" charset="0"/>
+                <a:cs typeface="Times New Roman" panose="02020603050405020304" pitchFamily="18" charset="0"/>
+              </a:rPr>
+              <a:t>soát</a:t>
+            </a:r>
+            <a:endParaRPr lang="en-US" sz="1050" dirty="0">
+              <a:latin typeface="Times New Roman" panose="02020603050405020304" pitchFamily="18" charset="0"/>
+              <a:cs typeface="Times New Roman" panose="02020603050405020304" pitchFamily="18" charset="0"/>
+            </a:endParaRPr>
+          </a:p>
+        </p:txBody>
+      </p:sp>
+      <p:sp>
+        <p:nvSpPr>
+          <p:cNvPr id="10" name="TextBox 9"/>
+          <p:cNvSpPr txBox="1"/>
+          <p:nvPr/>
+        </p:nvSpPr>
+        <p:spPr>
+          <a:xfrm>
+            <a:off x="3021367" y="5241860"/>
+            <a:ext cx="2540979" cy="461665"/>
+          </a:xfrm>
+          <a:prstGeom prst="rect">
+            <a:avLst/>
+          </a:prstGeom>
+          <a:noFill/>
+        </p:spPr>
+        <p:txBody>
+          <a:bodyPr wrap="square" rtlCol="0">
+            <a:spAutoFit/>
+          </a:bodyPr>
+          <a:lstStyle/>
+          <a:p>
+            <a:r>
+              <a:rPr lang="en-US" sz="1200" dirty="0" err="1">
+                <a:solidFill>
+                  <a:srgbClr val="FF0000"/>
+                </a:solidFill>
+                <a:latin typeface="Times New Roman" panose="02020603050405020304" pitchFamily="18" charset="0"/>
+                <a:cs typeface="Times New Roman" panose="02020603050405020304" pitchFamily="18" charset="0"/>
+              </a:rPr>
+              <a:t>Sau</a:t>
+            </a:r>
+            <a:r>
+              <a:rPr lang="en-US" sz="1200" dirty="0">
+                <a:solidFill>
+                  <a:srgbClr val="FF0000"/>
+                </a:solidFill>
+                <a:latin typeface="Times New Roman" panose="02020603050405020304" pitchFamily="18" charset="0"/>
+                <a:cs typeface="Times New Roman" panose="02020603050405020304" pitchFamily="18" charset="0"/>
+              </a:rPr>
+              <a:t> </a:t>
+            </a:r>
+            <a:r>
+              <a:rPr lang="en-US" sz="1200" dirty="0" err="1">
+                <a:solidFill>
+                  <a:srgbClr val="FF0000"/>
+                </a:solidFill>
+                <a:latin typeface="Times New Roman" panose="02020603050405020304" pitchFamily="18" charset="0"/>
+                <a:cs typeface="Times New Roman" panose="02020603050405020304" pitchFamily="18" charset="0"/>
+              </a:rPr>
+              <a:t>khi</a:t>
+            </a:r>
+            <a:r>
+              <a:rPr lang="en-US" sz="1200" dirty="0">
+                <a:solidFill>
+                  <a:srgbClr val="FF0000"/>
+                </a:solidFill>
+                <a:latin typeface="Times New Roman" panose="02020603050405020304" pitchFamily="18" charset="0"/>
+                <a:cs typeface="Times New Roman" panose="02020603050405020304" pitchFamily="18" charset="0"/>
+              </a:rPr>
+              <a:t> </a:t>
+            </a:r>
+            <a:r>
+              <a:rPr lang="en-US" sz="1200" dirty="0" err="1">
+                <a:solidFill>
+                  <a:srgbClr val="FF0000"/>
+                </a:solidFill>
+                <a:latin typeface="Times New Roman" panose="02020603050405020304" pitchFamily="18" charset="0"/>
+                <a:cs typeface="Times New Roman" panose="02020603050405020304" pitchFamily="18" charset="0"/>
+              </a:rPr>
+              <a:t>gõ</a:t>
+            </a:r>
+            <a:r>
+              <a:rPr lang="en-US" sz="1200" dirty="0">
+                <a:solidFill>
+                  <a:srgbClr val="FF0000"/>
+                </a:solidFill>
+                <a:latin typeface="Times New Roman" panose="02020603050405020304" pitchFamily="18" charset="0"/>
+                <a:cs typeface="Times New Roman" panose="02020603050405020304" pitchFamily="18" charset="0"/>
+              </a:rPr>
+              <a:t> </a:t>
+            </a:r>
+            <a:r>
+              <a:rPr lang="en-US" sz="1200" dirty="0" err="1">
+                <a:solidFill>
+                  <a:srgbClr val="FF0000"/>
+                </a:solidFill>
+                <a:latin typeface="Times New Roman" panose="02020603050405020304" pitchFamily="18" charset="0"/>
+                <a:cs typeface="Times New Roman" panose="02020603050405020304" pitchFamily="18" charset="0"/>
+              </a:rPr>
+              <a:t>chuyển</a:t>
+            </a:r>
+            <a:r>
+              <a:rPr lang="en-US" sz="1200" dirty="0">
+                <a:solidFill>
+                  <a:srgbClr val="FF0000"/>
+                </a:solidFill>
+                <a:latin typeface="Times New Roman" panose="02020603050405020304" pitchFamily="18" charset="0"/>
+                <a:cs typeface="Times New Roman" panose="02020603050405020304" pitchFamily="18" charset="0"/>
+              </a:rPr>
+              <a:t> qua </a:t>
+            </a:r>
+            <a:r>
+              <a:rPr lang="en-US" sz="1200" dirty="0" err="1">
+                <a:solidFill>
+                  <a:srgbClr val="FF0000"/>
+                </a:solidFill>
+                <a:latin typeface="Times New Roman" panose="02020603050405020304" pitchFamily="18" charset="0"/>
+                <a:cs typeface="Times New Roman" panose="02020603050405020304" pitchFamily="18" charset="0"/>
+              </a:rPr>
+              <a:t>trạng</a:t>
+            </a:r>
+            <a:r>
+              <a:rPr lang="en-US" sz="1200" dirty="0">
+                <a:solidFill>
+                  <a:srgbClr val="FF0000"/>
+                </a:solidFill>
+                <a:latin typeface="Times New Roman" panose="02020603050405020304" pitchFamily="18" charset="0"/>
+                <a:cs typeface="Times New Roman" panose="02020603050405020304" pitchFamily="18" charset="0"/>
+              </a:rPr>
+              <a:t> </a:t>
+            </a:r>
+            <a:r>
+              <a:rPr lang="en-US" sz="1200" dirty="0" err="1">
+                <a:solidFill>
+                  <a:srgbClr val="FF0000"/>
+                </a:solidFill>
+                <a:latin typeface="Times New Roman" panose="02020603050405020304" pitchFamily="18" charset="0"/>
+                <a:cs typeface="Times New Roman" panose="02020603050405020304" pitchFamily="18" charset="0"/>
+              </a:rPr>
+              <a:t>thái</a:t>
+            </a:r>
+            <a:r>
+              <a:rPr lang="en-US" sz="1200" dirty="0">
+                <a:solidFill>
+                  <a:srgbClr val="FF0000"/>
+                </a:solidFill>
+                <a:latin typeface="Times New Roman" panose="02020603050405020304" pitchFamily="18" charset="0"/>
+                <a:cs typeface="Times New Roman" panose="02020603050405020304" pitchFamily="18" charset="0"/>
+              </a:rPr>
+              <a:t> </a:t>
+            </a:r>
+            <a:r>
+              <a:rPr lang="en-US" sz="1200" dirty="0" err="1">
+                <a:solidFill>
+                  <a:srgbClr val="FF0000"/>
+                </a:solidFill>
+                <a:latin typeface="Times New Roman" panose="02020603050405020304" pitchFamily="18" charset="0"/>
+                <a:cs typeface="Times New Roman" panose="02020603050405020304" pitchFamily="18" charset="0"/>
+              </a:rPr>
+              <a:t>màu</a:t>
+            </a:r>
+            <a:r>
+              <a:rPr lang="en-US" sz="1200" dirty="0">
+                <a:solidFill>
+                  <a:srgbClr val="FF0000"/>
+                </a:solidFill>
+                <a:latin typeface="Times New Roman" panose="02020603050405020304" pitchFamily="18" charset="0"/>
+                <a:cs typeface="Times New Roman" panose="02020603050405020304" pitchFamily="18" charset="0"/>
+              </a:rPr>
+              <a:t> </a:t>
+            </a:r>
+            <a:r>
+              <a:rPr lang="en-US" sz="1200" dirty="0" err="1">
+                <a:solidFill>
+                  <a:srgbClr val="FF0000"/>
+                </a:solidFill>
+                <a:latin typeface="Times New Roman" panose="02020603050405020304" pitchFamily="18" charset="0"/>
+                <a:cs typeface="Times New Roman" panose="02020603050405020304" pitchFamily="18" charset="0"/>
+              </a:rPr>
+              <a:t>xanh</a:t>
+            </a:r>
+            <a:r>
+              <a:rPr lang="en-US" sz="1200" dirty="0">
+                <a:solidFill>
+                  <a:srgbClr val="FF0000"/>
+                </a:solidFill>
+                <a:latin typeface="Times New Roman" panose="02020603050405020304" pitchFamily="18" charset="0"/>
+                <a:cs typeface="Times New Roman" panose="02020603050405020304" pitchFamily="18" charset="0"/>
+              </a:rPr>
+              <a:t>( File </a:t>
+            </a:r>
+            <a:r>
+              <a:rPr lang="en-US" sz="1200" dirty="0" err="1">
+                <a:solidFill>
+                  <a:srgbClr val="FF0000"/>
+                </a:solidFill>
+                <a:latin typeface="Times New Roman" panose="02020603050405020304" pitchFamily="18" charset="0"/>
+                <a:cs typeface="Times New Roman" panose="02020603050405020304" pitchFamily="18" charset="0"/>
+              </a:rPr>
+              <a:t>mới</a:t>
+            </a:r>
+            <a:r>
+              <a:rPr lang="en-US" sz="1200" dirty="0">
+                <a:solidFill>
+                  <a:srgbClr val="FF0000"/>
+                </a:solidFill>
+                <a:latin typeface="Times New Roman" panose="02020603050405020304" pitchFamily="18" charset="0"/>
+                <a:cs typeface="Times New Roman" panose="02020603050405020304" pitchFamily="18" charset="0"/>
+              </a:rPr>
+              <a:t> </a:t>
+            </a:r>
+            <a:r>
+              <a:rPr lang="en-US" sz="1200" dirty="0" err="1">
+                <a:solidFill>
+                  <a:srgbClr val="FF0000"/>
+                </a:solidFill>
+                <a:latin typeface="Times New Roman" panose="02020603050405020304" pitchFamily="18" charset="0"/>
+                <a:cs typeface="Times New Roman" panose="02020603050405020304" pitchFamily="18" charset="0"/>
+              </a:rPr>
+              <a:t>đã</a:t>
+            </a:r>
+            <a:r>
+              <a:rPr lang="en-US" sz="1200" dirty="0">
+                <a:solidFill>
+                  <a:srgbClr val="FF0000"/>
+                </a:solidFill>
+                <a:latin typeface="Times New Roman" panose="02020603050405020304" pitchFamily="18" charset="0"/>
+                <a:cs typeface="Times New Roman" panose="02020603050405020304" pitchFamily="18" charset="0"/>
+              </a:rPr>
+              <a:t> </a:t>
+            </a:r>
+            <a:r>
+              <a:rPr lang="en-US" sz="1200" dirty="0" err="1">
+                <a:solidFill>
+                  <a:srgbClr val="FF0000"/>
+                </a:solidFill>
+                <a:latin typeface="Times New Roman" panose="02020603050405020304" pitchFamily="18" charset="0"/>
+                <a:cs typeface="Times New Roman" panose="02020603050405020304" pitchFamily="18" charset="0"/>
+              </a:rPr>
+              <a:t>được</a:t>
+            </a:r>
+            <a:r>
+              <a:rPr lang="en-US" sz="1200" dirty="0">
+                <a:solidFill>
+                  <a:srgbClr val="FF0000"/>
+                </a:solidFill>
+                <a:latin typeface="Times New Roman" panose="02020603050405020304" pitchFamily="18" charset="0"/>
+                <a:cs typeface="Times New Roman" panose="02020603050405020304" pitchFamily="18" charset="0"/>
+              </a:rPr>
+              <a:t> </a:t>
+            </a:r>
+            <a:r>
+              <a:rPr lang="en-US" sz="1200" dirty="0" err="1">
+                <a:solidFill>
+                  <a:srgbClr val="FF0000"/>
+                </a:solidFill>
+                <a:latin typeface="Times New Roman" panose="02020603050405020304" pitchFamily="18" charset="0"/>
+                <a:cs typeface="Times New Roman" panose="02020603050405020304" pitchFamily="18" charset="0"/>
+              </a:rPr>
+              <a:t>kiểm</a:t>
+            </a:r>
+            <a:r>
+              <a:rPr lang="en-US" sz="1200" dirty="0">
+                <a:solidFill>
+                  <a:srgbClr val="FF0000"/>
+                </a:solidFill>
+                <a:latin typeface="Times New Roman" panose="02020603050405020304" pitchFamily="18" charset="0"/>
+                <a:cs typeface="Times New Roman" panose="02020603050405020304" pitchFamily="18" charset="0"/>
+              </a:rPr>
+              <a:t> </a:t>
+            </a:r>
+            <a:r>
+              <a:rPr lang="en-US" sz="1200" dirty="0" err="1">
+                <a:solidFill>
+                  <a:srgbClr val="FF0000"/>
+                </a:solidFill>
+                <a:latin typeface="Times New Roman" panose="02020603050405020304" pitchFamily="18" charset="0"/>
+                <a:cs typeface="Times New Roman" panose="02020603050405020304" pitchFamily="18" charset="0"/>
+              </a:rPr>
+              <a:t>soát</a:t>
+            </a:r>
+            <a:r>
+              <a:rPr lang="en-US" sz="1200" dirty="0">
+                <a:solidFill>
+                  <a:srgbClr val="FF0000"/>
+                </a:solidFill>
+                <a:latin typeface="Times New Roman" panose="02020603050405020304" pitchFamily="18" charset="0"/>
+                <a:cs typeface="Times New Roman" panose="02020603050405020304" pitchFamily="18" charset="0"/>
+              </a:rPr>
+              <a:t>)</a:t>
+            </a:r>
+          </a:p>
+        </p:txBody>
+      </p:sp>
+      <p:cxnSp>
+        <p:nvCxnSpPr>
+          <p:cNvPr id="12" name="Straight Arrow Connector 11"/>
+          <p:cNvCxnSpPr/>
+          <p:nvPr/>
+        </p:nvCxnSpPr>
+        <p:spPr>
+          <a:xfrm flipH="1" flipV="1">
+            <a:off x="3358662" y="4457701"/>
+            <a:ext cx="870438" cy="891450"/>
+          </a:xfrm>
+          <a:prstGeom prst="straightConnector1">
+            <a:avLst/>
+          </a:prstGeom>
+          <a:ln>
+            <a:tailEnd type="triangle"/>
+          </a:ln>
+        </p:spPr>
+        <p:style>
+          <a:lnRef idx="1">
+            <a:schemeClr val="accent2"/>
+          </a:lnRef>
+          <a:fillRef idx="0">
+            <a:schemeClr val="accent2"/>
+          </a:fillRef>
+          <a:effectRef idx="0">
+            <a:schemeClr val="accent2"/>
+          </a:effectRef>
+          <a:fontRef idx="minor">
+            <a:schemeClr val="tx1"/>
+          </a:fontRef>
+        </p:style>
+      </p:cxnSp>
+      <p:sp>
+        <p:nvSpPr>
+          <p:cNvPr id="13" name="TextBox 12"/>
+          <p:cNvSpPr txBox="1"/>
+          <p:nvPr/>
+        </p:nvSpPr>
+        <p:spPr>
+          <a:xfrm>
+            <a:off x="3068515" y="1283677"/>
+            <a:ext cx="1767254" cy="738664"/>
+          </a:xfrm>
+          <a:prstGeom prst="rect">
+            <a:avLst/>
+          </a:prstGeom>
+          <a:noFill/>
+        </p:spPr>
+        <p:txBody>
+          <a:bodyPr wrap="square" rtlCol="0">
+            <a:spAutoFit/>
+          </a:bodyPr>
+          <a:lstStyle/>
+          <a:p>
+            <a:r>
+              <a:rPr lang="en-US" sz="1400" dirty="0" err="1">
+                <a:solidFill>
+                  <a:srgbClr val="FF0000"/>
+                </a:solidFill>
+                <a:latin typeface="Times New Roman" panose="02020603050405020304" pitchFamily="18" charset="0"/>
+                <a:cs typeface="Times New Roman" panose="02020603050405020304" pitchFamily="18" charset="0"/>
+              </a:rPr>
+              <a:t>Lưu</a:t>
+            </a:r>
+            <a:r>
+              <a:rPr lang="en-US" sz="1400" dirty="0">
+                <a:solidFill>
+                  <a:srgbClr val="FF0000"/>
+                </a:solidFill>
+                <a:latin typeface="Times New Roman" panose="02020603050405020304" pitchFamily="18" charset="0"/>
+                <a:cs typeface="Times New Roman" panose="02020603050405020304" pitchFamily="18" charset="0"/>
+              </a:rPr>
+              <a:t> </a:t>
+            </a:r>
+            <a:r>
+              <a:rPr lang="en-US" sz="1400" dirty="0" err="1">
+                <a:solidFill>
+                  <a:srgbClr val="FF0000"/>
+                </a:solidFill>
+                <a:latin typeface="Times New Roman" panose="02020603050405020304" pitchFamily="18" charset="0"/>
+                <a:cs typeface="Times New Roman" panose="02020603050405020304" pitchFamily="18" charset="0"/>
+              </a:rPr>
+              <a:t>trạng</a:t>
+            </a:r>
+            <a:r>
+              <a:rPr lang="en-US" sz="1400" dirty="0">
+                <a:solidFill>
+                  <a:srgbClr val="FF0000"/>
+                </a:solidFill>
+                <a:latin typeface="Times New Roman" panose="02020603050405020304" pitchFamily="18" charset="0"/>
+                <a:cs typeface="Times New Roman" panose="02020603050405020304" pitchFamily="18" charset="0"/>
+              </a:rPr>
+              <a:t> </a:t>
+            </a:r>
+            <a:r>
+              <a:rPr lang="en-US" sz="1400" dirty="0" err="1">
+                <a:solidFill>
+                  <a:srgbClr val="FF0000"/>
+                </a:solidFill>
+                <a:latin typeface="Times New Roman" panose="02020603050405020304" pitchFamily="18" charset="0"/>
+                <a:cs typeface="Times New Roman" panose="02020603050405020304" pitchFamily="18" charset="0"/>
+              </a:rPr>
+              <a:t>thái</a:t>
+            </a:r>
+            <a:r>
+              <a:rPr lang="en-US" sz="1400" dirty="0">
+                <a:solidFill>
+                  <a:srgbClr val="FF0000"/>
+                </a:solidFill>
+                <a:latin typeface="Times New Roman" panose="02020603050405020304" pitchFamily="18" charset="0"/>
+                <a:cs typeface="Times New Roman" panose="02020603050405020304" pitchFamily="18" charset="0"/>
+              </a:rPr>
+              <a:t> </a:t>
+            </a:r>
+            <a:r>
+              <a:rPr lang="en-US" sz="1400" dirty="0" err="1">
+                <a:solidFill>
+                  <a:srgbClr val="FF0000"/>
+                </a:solidFill>
+                <a:latin typeface="Times New Roman" panose="02020603050405020304" pitchFamily="18" charset="0"/>
+                <a:cs typeface="Times New Roman" panose="02020603050405020304" pitchFamily="18" charset="0"/>
+              </a:rPr>
+              <a:t>để</a:t>
+            </a:r>
+            <a:r>
+              <a:rPr lang="en-US" sz="1400" dirty="0">
+                <a:solidFill>
+                  <a:srgbClr val="FF0000"/>
+                </a:solidFill>
+                <a:latin typeface="Times New Roman" panose="02020603050405020304" pitchFamily="18" charset="0"/>
+                <a:cs typeface="Times New Roman" panose="02020603050405020304" pitchFamily="18" charset="0"/>
+              </a:rPr>
+              <a:t> </a:t>
+            </a:r>
+            <a:r>
+              <a:rPr lang="en-US" sz="1400" dirty="0" err="1">
+                <a:solidFill>
+                  <a:srgbClr val="FF0000"/>
+                </a:solidFill>
+                <a:latin typeface="Times New Roman" panose="02020603050405020304" pitchFamily="18" charset="0"/>
+                <a:cs typeface="Times New Roman" panose="02020603050405020304" pitchFamily="18" charset="0"/>
+              </a:rPr>
+              <a:t>kiểm</a:t>
+            </a:r>
+            <a:r>
+              <a:rPr lang="en-US" sz="1400" dirty="0">
+                <a:solidFill>
+                  <a:srgbClr val="FF0000"/>
+                </a:solidFill>
+                <a:latin typeface="Times New Roman" panose="02020603050405020304" pitchFamily="18" charset="0"/>
+                <a:cs typeface="Times New Roman" panose="02020603050405020304" pitchFamily="18" charset="0"/>
+              </a:rPr>
+              <a:t> </a:t>
+            </a:r>
+            <a:r>
+              <a:rPr lang="en-US" sz="1400" dirty="0" err="1">
+                <a:solidFill>
+                  <a:srgbClr val="FF0000"/>
+                </a:solidFill>
+                <a:latin typeface="Times New Roman" panose="02020603050405020304" pitchFamily="18" charset="0"/>
+                <a:cs typeface="Times New Roman" panose="02020603050405020304" pitchFamily="18" charset="0"/>
+              </a:rPr>
+              <a:t>xem</a:t>
+            </a:r>
+            <a:r>
+              <a:rPr lang="en-US" sz="1400" dirty="0">
+                <a:solidFill>
+                  <a:srgbClr val="FF0000"/>
+                </a:solidFill>
+                <a:latin typeface="Times New Roman" panose="02020603050405020304" pitchFamily="18" charset="0"/>
+                <a:cs typeface="Times New Roman" panose="02020603050405020304" pitchFamily="18" charset="0"/>
+              </a:rPr>
+              <a:t> File </a:t>
+            </a:r>
+            <a:r>
+              <a:rPr lang="en-US" sz="1400" dirty="0" err="1">
+                <a:solidFill>
+                  <a:srgbClr val="FF0000"/>
+                </a:solidFill>
+                <a:latin typeface="Times New Roman" panose="02020603050405020304" pitchFamily="18" charset="0"/>
+                <a:cs typeface="Times New Roman" panose="02020603050405020304" pitchFamily="18" charset="0"/>
+              </a:rPr>
+              <a:t>nào</a:t>
+            </a:r>
+            <a:r>
+              <a:rPr lang="en-US" sz="1400" dirty="0">
+                <a:solidFill>
+                  <a:srgbClr val="FF0000"/>
+                </a:solidFill>
+                <a:latin typeface="Times New Roman" panose="02020603050405020304" pitchFamily="18" charset="0"/>
+                <a:cs typeface="Times New Roman" panose="02020603050405020304" pitchFamily="18" charset="0"/>
+              </a:rPr>
+              <a:t> </a:t>
+            </a:r>
+            <a:r>
+              <a:rPr lang="en-US" sz="1400" dirty="0" err="1">
+                <a:solidFill>
+                  <a:srgbClr val="FF0000"/>
+                </a:solidFill>
+                <a:latin typeface="Times New Roman" panose="02020603050405020304" pitchFamily="18" charset="0"/>
+                <a:cs typeface="Times New Roman" panose="02020603050405020304" pitchFamily="18" charset="0"/>
+              </a:rPr>
+              <a:t>mới</a:t>
+            </a:r>
+            <a:r>
+              <a:rPr lang="en-US" sz="1400" dirty="0">
+                <a:solidFill>
+                  <a:srgbClr val="FF0000"/>
+                </a:solidFill>
+                <a:latin typeface="Times New Roman" panose="02020603050405020304" pitchFamily="18" charset="0"/>
+                <a:cs typeface="Times New Roman" panose="02020603050405020304" pitchFamily="18" charset="0"/>
+              </a:rPr>
+              <a:t> them </a:t>
+            </a:r>
+            <a:r>
+              <a:rPr lang="en-US" sz="1400" dirty="0" err="1">
+                <a:solidFill>
+                  <a:srgbClr val="FF0000"/>
+                </a:solidFill>
+                <a:latin typeface="Times New Roman" panose="02020603050405020304" pitchFamily="18" charset="0"/>
+                <a:cs typeface="Times New Roman" panose="02020603050405020304" pitchFamily="18" charset="0"/>
+              </a:rPr>
+              <a:t>vào</a:t>
+            </a:r>
+            <a:r>
+              <a:rPr lang="en-US" sz="1400" dirty="0">
+                <a:solidFill>
+                  <a:srgbClr val="FF0000"/>
+                </a:solidFill>
+                <a:latin typeface="Times New Roman" panose="02020603050405020304" pitchFamily="18" charset="0"/>
+                <a:cs typeface="Times New Roman" panose="02020603050405020304" pitchFamily="18" charset="0"/>
+              </a:rPr>
+              <a:t>.</a:t>
+            </a:r>
+          </a:p>
+        </p:txBody>
+      </p:sp>
+      <p:sp>
+        <p:nvSpPr>
+          <p:cNvPr id="14" name="TextBox 13"/>
+          <p:cNvSpPr txBox="1"/>
+          <p:nvPr/>
+        </p:nvSpPr>
+        <p:spPr>
+          <a:xfrm>
+            <a:off x="774936" y="6173965"/>
+            <a:ext cx="3977306" cy="369332"/>
+          </a:xfrm>
+          <a:prstGeom prst="rect">
+            <a:avLst/>
+          </a:prstGeom>
+          <a:noFill/>
+        </p:spPr>
+        <p:txBody>
+          <a:bodyPr wrap="square" rtlCol="0">
+            <a:spAutoFit/>
+          </a:bodyPr>
+          <a:lstStyle/>
+          <a:p>
+            <a:r>
+              <a:rPr lang="en-US" dirty="0" err="1"/>
+              <a:t>Ghi</a:t>
+            </a:r>
+            <a:r>
+              <a:rPr lang="en-US" dirty="0"/>
+              <a:t> </a:t>
+            </a:r>
+            <a:r>
+              <a:rPr lang="en-US" dirty="0" err="1"/>
+              <a:t>nhận</a:t>
+            </a:r>
+            <a:r>
+              <a:rPr lang="en-US" dirty="0"/>
+              <a:t>( </a:t>
+            </a:r>
+            <a:r>
+              <a:rPr lang="en-US" dirty="0" err="1"/>
+              <a:t>Nhớ</a:t>
+            </a:r>
+            <a:r>
+              <a:rPr lang="en-US" dirty="0"/>
+              <a:t>) </a:t>
+            </a:r>
+            <a:r>
+              <a:rPr lang="en-US" dirty="0" err="1"/>
+              <a:t>sự</a:t>
+            </a:r>
+            <a:r>
+              <a:rPr lang="en-US" dirty="0"/>
+              <a:t> </a:t>
+            </a:r>
+            <a:r>
+              <a:rPr lang="en-US" dirty="0" err="1"/>
+              <a:t>thay</a:t>
+            </a:r>
+            <a:r>
+              <a:rPr lang="en-US" dirty="0"/>
+              <a:t> </a:t>
+            </a:r>
+            <a:r>
+              <a:rPr lang="en-US" dirty="0" err="1"/>
+              <a:t>đổi</a:t>
+            </a:r>
+            <a:r>
+              <a:rPr lang="en-US" dirty="0"/>
+              <a:t> </a:t>
+            </a:r>
+            <a:r>
+              <a:rPr lang="en-US" dirty="0" err="1"/>
+              <a:t>của</a:t>
+            </a:r>
+            <a:r>
+              <a:rPr lang="en-US" dirty="0"/>
+              <a:t> </a:t>
+            </a:r>
+            <a:r>
+              <a:rPr lang="en-US" dirty="0" err="1"/>
+              <a:t>các</a:t>
+            </a:r>
+            <a:r>
+              <a:rPr lang="en-US" dirty="0"/>
+              <a:t> File.</a:t>
+            </a:r>
+          </a:p>
+        </p:txBody>
+      </p:sp>
+      <p:sp>
+        <p:nvSpPr>
+          <p:cNvPr id="15" name="Down Arrow 14"/>
+          <p:cNvSpPr/>
+          <p:nvPr/>
+        </p:nvSpPr>
+        <p:spPr>
+          <a:xfrm>
+            <a:off x="2376347" y="4771982"/>
+            <a:ext cx="387242" cy="1409461"/>
+          </a:xfrm>
+          <a:prstGeom prst="downArrow">
+            <a:avLst/>
+          </a:prstGeom>
+        </p:spPr>
+        <p:style>
+          <a:lnRef idx="2">
+            <a:schemeClr val="accent1">
+              <a:shade val="50000"/>
+            </a:schemeClr>
+          </a:lnRef>
+          <a:fillRef idx="1">
+            <a:schemeClr val="accent1"/>
+          </a:fillRef>
+          <a:effectRef idx="0">
+            <a:schemeClr val="accent1"/>
+          </a:effectRef>
+          <a:fontRef idx="minor">
+            <a:schemeClr val="lt1"/>
+          </a:fontRef>
+        </p:style>
+        <p:txBody>
+          <a:bodyPr rtlCol="0" anchor="ctr"/>
+          <a:lstStyle/>
+          <a:p>
+            <a:pPr algn="ctr"/>
+            <a:endParaRPr lang="en-US"/>
+          </a:p>
+        </p:txBody>
+      </p:sp>
+      <p:cxnSp>
+        <p:nvCxnSpPr>
+          <p:cNvPr id="18" name="Straight Arrow Connector 17"/>
+          <p:cNvCxnSpPr/>
+          <p:nvPr/>
+        </p:nvCxnSpPr>
+        <p:spPr>
+          <a:xfrm>
+            <a:off x="5372100" y="4771982"/>
+            <a:ext cx="894844" cy="1401983"/>
+          </a:xfrm>
+          <a:prstGeom prst="straightConnector1">
+            <a:avLst/>
+          </a:prstGeom>
+          <a:ln>
+            <a:tailEnd type="triangle"/>
+          </a:ln>
+        </p:spPr>
+        <p:style>
+          <a:lnRef idx="1">
+            <a:schemeClr val="accent6"/>
+          </a:lnRef>
+          <a:fillRef idx="0">
+            <a:schemeClr val="accent6"/>
+          </a:fillRef>
+          <a:effectRef idx="0">
+            <a:schemeClr val="accent6"/>
+          </a:effectRef>
+          <a:fontRef idx="minor">
+            <a:schemeClr val="tx1"/>
+          </a:fontRef>
+        </p:style>
+      </p:cxnSp>
+      <p:sp>
+        <p:nvSpPr>
+          <p:cNvPr id="19" name="TextBox 18"/>
+          <p:cNvSpPr txBox="1"/>
+          <p:nvPr/>
+        </p:nvSpPr>
+        <p:spPr>
+          <a:xfrm>
+            <a:off x="5055578" y="6202557"/>
+            <a:ext cx="6840414" cy="369332"/>
+          </a:xfrm>
+          <a:prstGeom prst="rect">
+            <a:avLst/>
+          </a:prstGeom>
+          <a:noFill/>
+        </p:spPr>
+        <p:txBody>
+          <a:bodyPr wrap="square" rtlCol="0">
+            <a:spAutoFit/>
+          </a:bodyPr>
+          <a:lstStyle/>
+          <a:p>
+            <a:r>
               <a:rPr lang="en-US" dirty="0" err="1"/>
               <a:t>Đẩy</a:t>
             </a:r>
             <a:r>
               <a:rPr lang="en-US" dirty="0"/>
+              <a:t> Code( </a:t>
+            </a:r>
+            <a:r>
+              <a:rPr lang="en-US" dirty="0" err="1"/>
+              <a:t>tạo</a:t>
+            </a:r>
+            <a:r>
+              <a:rPr lang="en-US" dirty="0"/>
+              <a:t> </a:t>
+            </a:r>
+            <a:r>
+              <a:rPr lang="en-US" dirty="0" err="1"/>
+              <a:t>phiên</a:t>
+            </a:r>
+            <a:r>
+              <a:rPr lang="en-US" dirty="0"/>
+              <a:t> </a:t>
+            </a:r>
+            <a:r>
+              <a:rPr lang="en-US" dirty="0" err="1"/>
+              <a:t>bản</a:t>
+            </a:r>
+            <a:r>
+              <a:rPr lang="en-US" dirty="0"/>
+              <a:t> Backup) </a:t>
+            </a:r>
+            <a:r>
+              <a:rPr lang="en-US" dirty="0" err="1"/>
+              <a:t>vào</a:t>
+            </a:r>
+            <a:r>
+              <a:rPr lang="en-US" dirty="0"/>
+              <a:t> .</a:t>
+            </a:r>
+            <a:r>
+              <a:rPr lang="en-US" dirty="0" err="1"/>
+              <a:t>git</a:t>
+            </a:r>
+            <a:r>
+              <a:rPr lang="en-US" dirty="0"/>
+              <a:t> </a:t>
+            </a:r>
+            <a:r>
+              <a:rPr lang="en-US" dirty="0" err="1"/>
+              <a:t>tại</a:t>
+            </a:r>
+            <a:r>
+              <a:rPr lang="en-US" dirty="0"/>
+              <a:t> Local </a:t>
+            </a:r>
+            <a:r>
+              <a:rPr lang="en-US" dirty="0" err="1"/>
+              <a:t>để</a:t>
+            </a:r>
+            <a:r>
+              <a:rPr lang="en-US" dirty="0"/>
+              <a:t> </a:t>
+            </a:r>
+            <a:r>
+              <a:rPr lang="en-US" dirty="0" err="1"/>
+              <a:t>chứa</a:t>
+            </a:r>
+            <a:endParaRPr lang="en-US" dirty="0"/>
+          </a:p>
+        </p:txBody>
+      </p:sp>
+      <p:pic>
+        <p:nvPicPr>
+          <p:cNvPr id="22" name="Picture 21"/>
+          <p:cNvPicPr>
+            <a:picLocks noChangeAspect="1"/>
+          </p:cNvPicPr>
+          <p:nvPr/>
+        </p:nvPicPr>
+        <p:blipFill>
+          <a:blip r:embed="rId4"/>
+          <a:stretch>
+            <a:fillRect/>
+          </a:stretch>
+        </p:blipFill>
+        <p:spPr>
+          <a:xfrm>
+            <a:off x="5055578" y="1117659"/>
+            <a:ext cx="1620136" cy="885949"/>
+          </a:xfrm>
+          <a:prstGeom prst="rect">
+            <a:avLst/>
+          </a:prstGeom>
+        </p:spPr>
+      </p:pic>
+      <p:sp>
+        <p:nvSpPr>
+          <p:cNvPr id="23" name="TextBox 22"/>
+          <p:cNvSpPr txBox="1"/>
+          <p:nvPr/>
+        </p:nvSpPr>
+        <p:spPr>
+          <a:xfrm>
+            <a:off x="5111742" y="2985769"/>
+            <a:ext cx="1415560" cy="646331"/>
+          </a:xfrm>
+          <a:prstGeom prst="rect">
+            <a:avLst/>
+          </a:prstGeom>
+          <a:noFill/>
+        </p:spPr>
+        <p:txBody>
+          <a:bodyPr wrap="square" rtlCol="0">
+            <a:spAutoFit/>
+          </a:bodyPr>
+          <a:lstStyle/>
+          <a:p>
+            <a:r>
+              <a:rPr lang="en-US" dirty="0" err="1"/>
+              <a:t>Nơi</a:t>
+            </a:r>
+            <a:r>
+              <a:rPr lang="en-US" dirty="0"/>
+              <a:t> </a:t>
+            </a:r>
+            <a:r>
+              <a:rPr lang="en-US" dirty="0" err="1"/>
+              <a:t>lưu</a:t>
+            </a:r>
+            <a:r>
+              <a:rPr lang="en-US" dirty="0"/>
               <a:t> Code </a:t>
             </a:r>
             <a:r>
               <a:rPr lang="en-US" dirty="0" err="1"/>
-              <a:t>từ</a:t>
-            </a:r>
-            <a:r>
-              <a:rPr lang="en-US" dirty="0"/>
-              <a:t> Local </a:t>
-            </a:r>
-            <a:r>
-              <a:rPr lang="en-US" dirty="0" err="1"/>
-              <a:t>lên</a:t>
-            </a:r>
-            <a:r>
-              <a:rPr lang="en-US" dirty="0"/>
-              <a:t> Remote.</a:t>
+              <a:t>tại</a:t>
+            </a:r>
+            <a:r>
+              <a:rPr lang="en-US" dirty="0"/>
+              <a:t> Local.</a:t>
             </a:r>
           </a:p>
         </p:txBody>
@@ -7746,7 +7573,7 @@
     </p:spTree>
     <p:extLst>
       <p:ext uri="{BB962C8B-B14F-4D97-AF65-F5344CB8AC3E}">
-        <p14:creationId xmlns:p14="http://schemas.microsoft.com/office/powerpoint/2010/main" val="1485544068"/>
+        <p14:creationId xmlns:p14="http://schemas.microsoft.com/office/powerpoint/2010/main" val="347252250"/>
       </p:ext>
     </p:extLst>
   </p:cSld>
@@ -7773,9 +7600,35 @@
           <a:chExt cx="0" cy="0"/>
         </a:xfrm>
       </p:grpSpPr>
+      <p:sp>
+        <p:nvSpPr>
+          <p:cNvPr id="2" name="TextBox 1"/>
+          <p:cNvSpPr txBox="1"/>
+          <p:nvPr/>
+        </p:nvSpPr>
+        <p:spPr>
+          <a:xfrm>
+            <a:off x="861646" y="800100"/>
+            <a:ext cx="10937631" cy="4695092"/>
+          </a:xfrm>
+          <a:prstGeom prst="rect">
+            <a:avLst/>
+          </a:prstGeom>
+          <a:noFill/>
+        </p:spPr>
+        <p:txBody>
+          <a:bodyPr wrap="square" rtlCol="0">
+            <a:spAutoFit/>
+          </a:bodyPr>
+          <a:lstStyle/>
+          <a:p>
+            <a:endParaRPr lang="en-US" dirty="0"/>
+          </a:p>
+        </p:txBody>
+      </p:sp>
       <p:pic>
         <p:nvPicPr>
-          <p:cNvPr id="2" name="Picture 1"/>
+          <p:cNvPr id="3" name="Picture 2"/>
           <p:cNvPicPr>
             <a:picLocks noChangeAspect="1"/>
           </p:cNvPicPr>
@@ -7789,18 +7642,244 @@
         </p:blipFill>
         <p:spPr>
           <a:xfrm>
-            <a:off x="1438989" y="821818"/>
-            <a:ext cx="5515745" cy="3772426"/>
+            <a:off x="700400" y="3367454"/>
+            <a:ext cx="5534797" cy="2954215"/>
           </a:xfrm>
           <a:prstGeom prst="rect">
             <a:avLst/>
           </a:prstGeom>
         </p:spPr>
       </p:pic>
+      <p:pic>
+        <p:nvPicPr>
+          <p:cNvPr id="4" name="Picture 3"/>
+          <p:cNvPicPr>
+            <a:picLocks noChangeAspect="1"/>
+          </p:cNvPicPr>
+          <p:nvPr/>
+        </p:nvPicPr>
+        <p:blipFill>
+          <a:blip r:embed="rId3"/>
+          <a:stretch>
+            <a:fillRect/>
+          </a:stretch>
+        </p:blipFill>
+        <p:spPr>
+          <a:xfrm>
+            <a:off x="605137" y="690555"/>
+            <a:ext cx="5725324" cy="2676899"/>
+          </a:xfrm>
+          <a:prstGeom prst="rect">
+            <a:avLst/>
+          </a:prstGeom>
+        </p:spPr>
+      </p:pic>
+      <p:sp>
+        <p:nvSpPr>
+          <p:cNvPr id="5" name="TextBox 4"/>
+          <p:cNvSpPr txBox="1"/>
+          <p:nvPr/>
+        </p:nvSpPr>
+        <p:spPr>
+          <a:xfrm>
+            <a:off x="6594231" y="800100"/>
+            <a:ext cx="5205046" cy="646331"/>
+          </a:xfrm>
+          <a:prstGeom prst="rect">
+            <a:avLst/>
+          </a:prstGeom>
+          <a:noFill/>
+        </p:spPr>
+        <p:txBody>
+          <a:bodyPr wrap="square" rtlCol="0">
+            <a:spAutoFit/>
+          </a:bodyPr>
+          <a:lstStyle/>
+          <a:p>
+            <a:r>
+              <a:rPr lang="en-US" dirty="0" err="1"/>
+              <a:t>Hiển</a:t>
+            </a:r>
+            <a:r>
+              <a:rPr lang="en-US" dirty="0"/>
+              <a:t> </a:t>
+            </a:r>
+            <a:r>
+              <a:rPr lang="en-US" dirty="0" err="1"/>
+              <a:t>thị</a:t>
+            </a:r>
+            <a:r>
+              <a:rPr lang="en-US" dirty="0"/>
+              <a:t> </a:t>
+            </a:r>
+            <a:r>
+              <a:rPr lang="en-US" dirty="0" err="1"/>
+              <a:t>trạng</a:t>
+            </a:r>
+            <a:r>
+              <a:rPr lang="en-US" dirty="0"/>
+              <a:t> </a:t>
+            </a:r>
+            <a:r>
+              <a:rPr lang="en-US" dirty="0" err="1"/>
+              <a:t>thái</a:t>
+            </a:r>
+            <a:r>
+              <a:rPr lang="en-US" dirty="0"/>
+              <a:t> </a:t>
+            </a:r>
+            <a:r>
+              <a:rPr lang="en-US" dirty="0" err="1"/>
+              <a:t>các</a:t>
+            </a:r>
+            <a:r>
+              <a:rPr lang="en-US" dirty="0"/>
+              <a:t> File </a:t>
+            </a:r>
+            <a:r>
+              <a:rPr lang="en-US" dirty="0" err="1"/>
+              <a:t>trên</a:t>
+            </a:r>
+            <a:r>
+              <a:rPr lang="en-US" dirty="0"/>
+              <a:t> </a:t>
+            </a:r>
+            <a:r>
+              <a:rPr lang="en-US" dirty="0" err="1"/>
+              <a:t>máy</a:t>
+            </a:r>
+            <a:r>
+              <a:rPr lang="en-US" dirty="0"/>
+              <a:t> </a:t>
+            </a:r>
+            <a:r>
+              <a:rPr lang="en-US" dirty="0" err="1"/>
+              <a:t>tính</a:t>
+            </a:r>
+            <a:r>
+              <a:rPr lang="en-US" dirty="0"/>
+              <a:t>, </a:t>
+            </a:r>
+            <a:r>
+              <a:rPr lang="en-US" dirty="0" err="1"/>
+              <a:t>hiển</a:t>
+            </a:r>
+            <a:r>
+              <a:rPr lang="en-US" dirty="0"/>
+              <a:t> </a:t>
+            </a:r>
+            <a:r>
+              <a:rPr lang="en-US" dirty="0" err="1"/>
+              <a:t>thị</a:t>
+            </a:r>
+            <a:r>
+              <a:rPr lang="en-US" dirty="0"/>
+              <a:t> </a:t>
+            </a:r>
+            <a:r>
+              <a:rPr lang="en-US" dirty="0" err="1"/>
+              <a:t>trạng</a:t>
+            </a:r>
+            <a:r>
+              <a:rPr lang="en-US" dirty="0"/>
+              <a:t> </a:t>
+            </a:r>
+            <a:r>
+              <a:rPr lang="en-US" dirty="0" err="1"/>
+              <a:t>thái</a:t>
+            </a:r>
+            <a:r>
+              <a:rPr lang="en-US" dirty="0"/>
+              <a:t> them </a:t>
+            </a:r>
+            <a:r>
+              <a:rPr lang="en-US" dirty="0" err="1"/>
+              <a:t>sửa</a:t>
+            </a:r>
+            <a:r>
+              <a:rPr lang="en-US" dirty="0"/>
+              <a:t> </a:t>
+            </a:r>
+            <a:r>
+              <a:rPr lang="en-US" dirty="0" err="1"/>
+              <a:t>xóa</a:t>
+            </a:r>
+            <a:r>
+              <a:rPr lang="en-US" dirty="0"/>
+              <a:t> </a:t>
+            </a:r>
+            <a:r>
+              <a:rPr lang="en-US" dirty="0" err="1"/>
+              <a:t>của</a:t>
+            </a:r>
+            <a:r>
+              <a:rPr lang="en-US" dirty="0"/>
+              <a:t> File.</a:t>
+            </a:r>
+          </a:p>
+        </p:txBody>
+      </p:sp>
+      <p:sp>
+        <p:nvSpPr>
+          <p:cNvPr id="6" name="TextBox 5"/>
+          <p:cNvSpPr txBox="1"/>
+          <p:nvPr/>
+        </p:nvSpPr>
+        <p:spPr>
+          <a:xfrm>
+            <a:off x="6708531" y="3367454"/>
+            <a:ext cx="5090746" cy="369332"/>
+          </a:xfrm>
+          <a:prstGeom prst="rect">
+            <a:avLst/>
+          </a:prstGeom>
+          <a:noFill/>
+        </p:spPr>
+        <p:txBody>
+          <a:bodyPr wrap="square" rtlCol="0">
+            <a:spAutoFit/>
+          </a:bodyPr>
+          <a:lstStyle/>
+          <a:p>
+            <a:r>
+              <a:rPr lang="en-US" dirty="0" err="1"/>
+              <a:t>Lưu</a:t>
+            </a:r>
+            <a:r>
+              <a:rPr lang="en-US" dirty="0"/>
+              <a:t> </a:t>
+            </a:r>
+            <a:r>
+              <a:rPr lang="en-US" dirty="0" err="1"/>
+              <a:t>lại</a:t>
+            </a:r>
+            <a:r>
+              <a:rPr lang="en-US" dirty="0"/>
+              <a:t> </a:t>
+            </a:r>
+            <a:r>
+              <a:rPr lang="en-US" dirty="0" err="1"/>
+              <a:t>các</a:t>
+            </a:r>
+            <a:r>
+              <a:rPr lang="en-US" dirty="0"/>
+              <a:t> File </a:t>
+            </a:r>
+            <a:r>
+              <a:rPr lang="en-US" dirty="0" err="1"/>
+              <a:t>này</a:t>
+            </a:r>
+            <a:r>
+              <a:rPr lang="en-US" dirty="0"/>
+              <a:t>.</a:t>
+            </a:r>
+          </a:p>
+        </p:txBody>
+      </p:sp>
     </p:spTree>
     <p:extLst>
       <p:ext uri="{BB962C8B-B14F-4D97-AF65-F5344CB8AC3E}">
-        <p14:creationId xmlns:p14="http://schemas.microsoft.com/office/powerpoint/2010/main" val="2297257281"/>
+        <p14:creationId xmlns:p14="http://schemas.microsoft.com/office/powerpoint/2010/main" val="2545016784"/>
       </p:ext>
     </p:extLst>
   </p:cSld>
@@ -7827,10 +7906,245 @@
           <a:chExt cx="0" cy="0"/>
         </a:xfrm>
       </p:grpSpPr>
+      <p:pic>
+        <p:nvPicPr>
+          <p:cNvPr id="3" name="Picture 2"/>
+          <p:cNvPicPr>
+            <a:picLocks noChangeAspect="1"/>
+          </p:cNvPicPr>
+          <p:nvPr/>
+        </p:nvPicPr>
+        <p:blipFill>
+          <a:blip r:embed="rId2"/>
+          <a:stretch>
+            <a:fillRect/>
+          </a:stretch>
+        </p:blipFill>
+        <p:spPr>
+          <a:xfrm>
+            <a:off x="431528" y="417841"/>
+            <a:ext cx="5649113" cy="2276793"/>
+          </a:xfrm>
+          <a:prstGeom prst="rect">
+            <a:avLst/>
+          </a:prstGeom>
+        </p:spPr>
+      </p:pic>
+      <p:sp>
+        <p:nvSpPr>
+          <p:cNvPr id="4" name="TextBox 3"/>
+          <p:cNvSpPr txBox="1"/>
+          <p:nvPr/>
+        </p:nvSpPr>
+        <p:spPr>
+          <a:xfrm>
+            <a:off x="6585438" y="483577"/>
+            <a:ext cx="5046785" cy="369332"/>
+          </a:xfrm>
+          <a:prstGeom prst="rect">
+            <a:avLst/>
+          </a:prstGeom>
+          <a:noFill/>
+        </p:spPr>
+        <p:txBody>
+          <a:bodyPr wrap="square" rtlCol="0">
+            <a:spAutoFit/>
+          </a:bodyPr>
+          <a:lstStyle/>
+          <a:p>
+            <a:r>
+              <a:rPr lang="en-US" dirty="0" err="1"/>
+              <a:t>Giống</a:t>
+            </a:r>
+            <a:r>
+              <a:rPr lang="en-US" dirty="0"/>
+              <a:t> </a:t>
+            </a:r>
+            <a:r>
+              <a:rPr lang="en-US" dirty="0" err="1"/>
+              <a:t>việc</a:t>
+            </a:r>
+            <a:r>
+              <a:rPr lang="en-US" dirty="0"/>
+              <a:t> Comment </a:t>
+            </a:r>
+            <a:r>
+              <a:rPr lang="en-US" dirty="0" err="1"/>
+              <a:t>nội</a:t>
+            </a:r>
+            <a:r>
+              <a:rPr lang="en-US" dirty="0"/>
+              <a:t> dung.</a:t>
+            </a:r>
+          </a:p>
+        </p:txBody>
+      </p:sp>
+      <p:sp>
+        <p:nvSpPr>
+          <p:cNvPr id="5" name="TextBox 4"/>
+          <p:cNvSpPr txBox="1"/>
+          <p:nvPr/>
+        </p:nvSpPr>
+        <p:spPr>
+          <a:xfrm>
+            <a:off x="6585438" y="1081454"/>
+            <a:ext cx="4510454" cy="369332"/>
+          </a:xfrm>
+          <a:prstGeom prst="rect">
+            <a:avLst/>
+          </a:prstGeom>
+          <a:noFill/>
+        </p:spPr>
+        <p:txBody>
+          <a:bodyPr wrap="square" rtlCol="0">
+            <a:spAutoFit/>
+          </a:bodyPr>
+          <a:lstStyle/>
+          <a:p>
+            <a:r>
+              <a:rPr lang="en-US" dirty="0" err="1"/>
+              <a:t>Chú</a:t>
+            </a:r>
+            <a:r>
+              <a:rPr lang="en-US" dirty="0"/>
+              <a:t> </a:t>
+            </a:r>
+            <a:r>
+              <a:rPr lang="en-US" dirty="0" err="1"/>
+              <a:t>thích</a:t>
+            </a:r>
+            <a:r>
+              <a:rPr lang="en-US" dirty="0"/>
+              <a:t> </a:t>
+            </a:r>
+            <a:r>
+              <a:rPr lang="en-US" dirty="0" err="1"/>
+              <a:t>cho</a:t>
+            </a:r>
+            <a:r>
+              <a:rPr lang="en-US" dirty="0"/>
+              <a:t> </a:t>
+            </a:r>
+            <a:r>
+              <a:rPr lang="en-US" dirty="0" err="1"/>
+              <a:t>nội</a:t>
+            </a:r>
+            <a:r>
+              <a:rPr lang="en-US" dirty="0"/>
+              <a:t> dung </a:t>
+            </a:r>
+            <a:r>
+              <a:rPr lang="en-US" dirty="0" err="1"/>
+              <a:t>công</a:t>
+            </a:r>
+            <a:r>
+              <a:rPr lang="en-US" dirty="0"/>
+              <a:t> </a:t>
+            </a:r>
+            <a:r>
+              <a:rPr lang="en-US" dirty="0" err="1"/>
+              <a:t>việc</a:t>
+            </a:r>
+            <a:r>
+              <a:rPr lang="en-US" dirty="0"/>
+              <a:t> </a:t>
+            </a:r>
+            <a:r>
+              <a:rPr lang="en-US" dirty="0" err="1"/>
+              <a:t>đang</a:t>
+            </a:r>
+            <a:r>
+              <a:rPr lang="en-US" dirty="0"/>
+              <a:t> </a:t>
+            </a:r>
+            <a:r>
+              <a:rPr lang="en-US" dirty="0" err="1"/>
+              <a:t>làm</a:t>
+            </a:r>
+            <a:r>
+              <a:rPr lang="en-US" dirty="0"/>
+              <a:t>.</a:t>
+            </a:r>
+          </a:p>
+        </p:txBody>
+      </p:sp>
+      <p:pic>
+        <p:nvPicPr>
+          <p:cNvPr id="6" name="Picture 5"/>
+          <p:cNvPicPr>
+            <a:picLocks noChangeAspect="1"/>
+          </p:cNvPicPr>
+          <p:nvPr/>
+        </p:nvPicPr>
+        <p:blipFill>
+          <a:blip r:embed="rId3"/>
+          <a:stretch>
+            <a:fillRect/>
+          </a:stretch>
+        </p:blipFill>
+        <p:spPr>
+          <a:xfrm>
+            <a:off x="431528" y="3100980"/>
+            <a:ext cx="5506218" cy="2010056"/>
+          </a:xfrm>
+          <a:prstGeom prst="rect">
+            <a:avLst/>
+          </a:prstGeom>
+        </p:spPr>
+      </p:pic>
+      <p:sp>
+        <p:nvSpPr>
+          <p:cNvPr id="7" name="TextBox 6"/>
+          <p:cNvSpPr txBox="1"/>
+          <p:nvPr/>
+        </p:nvSpPr>
+        <p:spPr>
+          <a:xfrm>
+            <a:off x="6585438" y="3077308"/>
+            <a:ext cx="5125916" cy="369332"/>
+          </a:xfrm>
+          <a:prstGeom prst="rect">
+            <a:avLst/>
+          </a:prstGeom>
+          <a:noFill/>
+        </p:spPr>
+        <p:txBody>
+          <a:bodyPr wrap="square" rtlCol="0">
+            <a:spAutoFit/>
+          </a:bodyPr>
+          <a:lstStyle/>
+          <a:p>
+            <a:r>
+              <a:rPr lang="en-US" dirty="0" err="1"/>
+              <a:t>Đẩy</a:t>
+            </a:r>
+            <a:r>
+              <a:rPr lang="en-US" dirty="0"/>
+              <a:t> Code </a:t>
+            </a:r>
+            <a:r>
+              <a:rPr lang="en-US" dirty="0" err="1"/>
+              <a:t>từ</a:t>
+            </a:r>
+            <a:r>
+              <a:rPr lang="en-US" dirty="0"/>
+              <a:t> Local </a:t>
+            </a:r>
+            <a:r>
+              <a:rPr lang="en-US" dirty="0" err="1"/>
+              <a:t>lên</a:t>
+            </a:r>
+            <a:r>
+              <a:rPr lang="en-US" dirty="0"/>
+              <a:t> Remote.</a:t>
+            </a:r>
+          </a:p>
+        </p:txBody>
+      </p:sp>
     </p:spTree>
     <p:extLst>
       <p:ext uri="{BB962C8B-B14F-4D97-AF65-F5344CB8AC3E}">
-        <p14:creationId xmlns:p14="http://schemas.microsoft.com/office/powerpoint/2010/main" val="1135379879"/>
+        <p14:creationId xmlns:p14="http://schemas.microsoft.com/office/powerpoint/2010/main" val="1485544068"/>
       </p:ext>
     </p:extLst>
   </p:cSld>
@@ -7857,10 +8171,34 @@
           <a:chExt cx="0" cy="0"/>
         </a:xfrm>
       </p:grpSpPr>
+      <p:pic>
+        <p:nvPicPr>
+          <p:cNvPr id="2" name="Picture 1"/>
+          <p:cNvPicPr>
+            <a:picLocks noChangeAspect="1"/>
+          </p:cNvPicPr>
+          <p:nvPr/>
+        </p:nvPicPr>
+        <p:blipFill>
+          <a:blip r:embed="rId2"/>
+          <a:stretch>
+            <a:fillRect/>
+          </a:stretch>
+        </p:blipFill>
+        <p:spPr>
+          <a:xfrm>
+            <a:off x="1438989" y="821818"/>
+            <a:ext cx="5515745" cy="3772426"/>
+          </a:xfrm>
+          <a:prstGeom prst="rect">
+            <a:avLst/>
+          </a:prstGeom>
+        </p:spPr>
+      </p:pic>
     </p:spTree>
     <p:extLst>
       <p:ext uri="{BB962C8B-B14F-4D97-AF65-F5344CB8AC3E}">
-        <p14:creationId xmlns:p14="http://schemas.microsoft.com/office/powerpoint/2010/main" val="3561867579"/>
+        <p14:creationId xmlns:p14="http://schemas.microsoft.com/office/powerpoint/2010/main" val="2297257281"/>
       </p:ext>
     </p:extLst>
   </p:cSld>
@@ -7890,7 +8228,7 @@
     </p:spTree>
     <p:extLst>
       <p:ext uri="{BB962C8B-B14F-4D97-AF65-F5344CB8AC3E}">
-        <p14:creationId xmlns:p14="http://schemas.microsoft.com/office/powerpoint/2010/main" val="4085071067"/>
+        <p14:creationId xmlns:p14="http://schemas.microsoft.com/office/powerpoint/2010/main" val="1135379879"/>
       </p:ext>
     </p:extLst>
   </p:cSld>
@@ -8179,6 +8517,66 @@
     <p:extLst>
       <p:ext uri="{BB962C8B-B14F-4D97-AF65-F5344CB8AC3E}">
         <p14:creationId xmlns:p14="http://schemas.microsoft.com/office/powerpoint/2010/main" val="2399936237"/>
+      </p:ext>
+    </p:extLst>
+  </p:cSld>
+  <p:clrMapOvr>
+    <a:masterClrMapping/>
+  </p:clrMapOvr>
+</p:sld>
+</file>
+
+<file path=ppt/slides/slide30.xml><?xml version="1.0" encoding="utf-8"?>
+<p:sld xmlns:a="http://schemas.openxmlformats.org/drawingml/2006/main" xmlns:r="http://schemas.openxmlformats.org/officeDocument/2006/relationships" xmlns:p="http://schemas.openxmlformats.org/presentationml/2006/main">
+  <p:cSld>
+    <p:spTree>
+      <p:nvGrpSpPr>
+        <p:cNvPr id="1" name=""/>
+        <p:cNvGrpSpPr/>
+        <p:nvPr/>
+      </p:nvGrpSpPr>
+      <p:grpSpPr>
+        <a:xfrm>
+          <a:off x="0" y="0"/>
+          <a:ext cx="0" cy="0"/>
+          <a:chOff x="0" y="0"/>
+          <a:chExt cx="0" cy="0"/>
+        </a:xfrm>
+      </p:grpSpPr>
+    </p:spTree>
+    <p:extLst>
+      <p:ext uri="{BB962C8B-B14F-4D97-AF65-F5344CB8AC3E}">
+        <p14:creationId xmlns:p14="http://schemas.microsoft.com/office/powerpoint/2010/main" val="3561867579"/>
+      </p:ext>
+    </p:extLst>
+  </p:cSld>
+  <p:clrMapOvr>
+    <a:masterClrMapping/>
+  </p:clrMapOvr>
+</p:sld>
+</file>
+
+<file path=ppt/slides/slide31.xml><?xml version="1.0" encoding="utf-8"?>
+<p:sld xmlns:a="http://schemas.openxmlformats.org/drawingml/2006/main" xmlns:r="http://schemas.openxmlformats.org/officeDocument/2006/relationships" xmlns:p="http://schemas.openxmlformats.org/presentationml/2006/main">
+  <p:cSld>
+    <p:spTree>
+      <p:nvGrpSpPr>
+        <p:cNvPr id="1" name=""/>
+        <p:cNvGrpSpPr/>
+        <p:nvPr/>
+      </p:nvGrpSpPr>
+      <p:grpSpPr>
+        <a:xfrm>
+          <a:off x="0" y="0"/>
+          <a:ext cx="0" cy="0"/>
+          <a:chOff x="0" y="0"/>
+          <a:chExt cx="0" cy="0"/>
+        </a:xfrm>
+      </p:grpSpPr>
+    </p:spTree>
+    <p:extLst>
+      <p:ext uri="{BB962C8B-B14F-4D97-AF65-F5344CB8AC3E}">
+        <p14:creationId xmlns:p14="http://schemas.microsoft.com/office/powerpoint/2010/main" val="4085071067"/>
       </p:ext>
     </p:extLst>
   </p:cSld>

</xml_diff>